<commit_message>
Blocking out the rest of the presentation
</commit_message>
<xml_diff>
--- a/ppt/Getting started with GIT.pptx
+++ b/ppt/Getting started with GIT.pptx
@@ -5,7 +5,7 @@
     <p:sldMasterId id="2147483648" r:id="rId1"/>
   </p:sldMasterIdLst>
   <p:notesMasterIdLst>
-    <p:notesMasterId r:id="rId38"/>
+    <p:notesMasterId r:id="rId42"/>
   </p:notesMasterIdLst>
   <p:sldIdLst>
     <p:sldId id="256" r:id="rId2"/>
@@ -40,10 +40,14 @@
     <p:sldId id="280" r:id="rId31"/>
     <p:sldId id="304" r:id="rId32"/>
     <p:sldId id="297" r:id="rId33"/>
-    <p:sldId id="302" r:id="rId34"/>
-    <p:sldId id="278" r:id="rId35"/>
-    <p:sldId id="277" r:id="rId36"/>
-    <p:sldId id="281" r:id="rId37"/>
+    <p:sldId id="305" r:id="rId34"/>
+    <p:sldId id="307" r:id="rId35"/>
+    <p:sldId id="306" r:id="rId36"/>
+    <p:sldId id="302" r:id="rId37"/>
+    <p:sldId id="308" r:id="rId38"/>
+    <p:sldId id="278" r:id="rId39"/>
+    <p:sldId id="277" r:id="rId40"/>
+    <p:sldId id="281" r:id="rId41"/>
   </p:sldIdLst>
   <p:sldSz cx="12192000" cy="6858000"/>
   <p:notesSz cx="6858000" cy="9144000"/>
@@ -144,7 +148,7 @@
   </p:defaultTextStyle>
   <p:extLst>
     <p:ext uri="{EFAFB233-063F-42B5-8137-9DF3F51BA10A}">
-      <p15:sldGuideLst xmlns:p15="http://schemas.microsoft.com/office/powerpoint/2012/main">
+      <p15:sldGuideLst xmlns:p15="http://schemas.microsoft.com/office/powerpoint/2012/main" xmlns="">
         <p15:guide id="1" orient="horz" pos="1102">
           <p15:clr>
             <a:srgbClr val="A4A3A4"/>
@@ -158,7 +162,7 @@
       </p15:sldGuideLst>
     </p:ext>
     <p:ext uri="{2D200454-40CA-4A62-9FC3-DE9A4176ACB9}">
-      <p15:notesGuideLst xmlns:p15="http://schemas.microsoft.com/office/powerpoint/2012/main"/>
+      <p15:notesGuideLst xmlns:p15="http://schemas.microsoft.com/office/powerpoint/2012/main" xmlns=""/>
     </p:ext>
   </p:extLst>
 </p:presentation>
@@ -169,7 +173,7 @@
   <p:cmAuthor id="1" name="Bourque, Blake J" initials="BBJ" lastIdx="3" clrIdx="0">
     <p:extLst>
       <p:ext uri="{19B8F6BF-5375-455C-9EA6-DF929625EA0E}">
-        <p15:presenceInfo xmlns:p15="http://schemas.microsoft.com/office/powerpoint/2012/main" userId="S-1-5-21-1940666338-227100268-1349548132-245462" providerId="AD"/>
+        <p15:presenceInfo xmlns:p15="http://schemas.microsoft.com/office/powerpoint/2012/main" xmlns="" userId="S-1-5-21-1940666338-227100268-1349548132-245462" providerId="AD"/>
       </p:ext>
     </p:extLst>
   </p:cmAuthor>
@@ -183,7 +187,7 @@
     <p:text>Maybe show the flow for a new respoitory</p:text>
     <p:extLst>
       <p:ext uri="{C676402C-5697-4E1C-873F-D02D1690AC5C}">
-        <p15:threadingInfo xmlns:p15="http://schemas.microsoft.com/office/powerpoint/2012/main" timeZoneBias="240"/>
+        <p15:threadingInfo xmlns:p15="http://schemas.microsoft.com/office/powerpoint/2012/main" xmlns="" timeZoneBias="240"/>
       </p:ext>
     </p:extLst>
   </p:cm>
@@ -272,7 +276,7 @@
           <a:p>
             <a:fld id="{5BF0D1F5-87A9-4BB2-9A71-7F50368497D7}" type="datetimeFigureOut">
               <a:rPr lang="en-US" smtClean="0"/>
-              <a:t>10/13/2015</a:t>
+              <a:t>10/14/2015</a:t>
             </a:fld>
             <a:endParaRPr lang="en-US"/>
           </a:p>
@@ -1819,6 +1823,14 @@
           <a:bodyPr/>
           <a:lstStyle/>
           <a:p>
+            <a:r>
+              <a:rPr lang="en-US" dirty="0" smtClean="0"/>
+              <a:t>There are</a:t>
+            </a:r>
+            <a:r>
+              <a:rPr lang="en-US" baseline="0" dirty="0" smtClean="0"/>
+              <a:t> a lot of ways to revert history. In my opinion this is the clearest and safest.</a:t>
+            </a:r>
             <a:endParaRPr lang="en-US" dirty="0"/>
           </a:p>
         </p:txBody>
@@ -1840,7 +1852,7 @@
           <a:p>
             <a:fld id="{F9A35D5F-9DC1-48C1-9A93-F2BBF67004F4}" type="slidenum">
               <a:rPr lang="en-US" smtClean="0"/>
-              <a:t>29</a:t>
+              <a:t>27</a:t>
             </a:fld>
             <a:endParaRPr lang="en-US"/>
           </a:p>
@@ -1849,7 +1861,7 @@
     </p:spTree>
     <p:extLst>
       <p:ext uri="{BB962C8B-B14F-4D97-AF65-F5344CB8AC3E}">
-        <p14:creationId xmlns:p14="http://schemas.microsoft.com/office/powerpoint/2010/main" val="387537523"/>
+        <p14:creationId xmlns:p14="http://schemas.microsoft.com/office/powerpoint/2010/main" val="144663783"/>
       </p:ext>
     </p:extLst>
   </p:cSld>
@@ -1903,9 +1915,545 @@
           <a:bodyPr/>
           <a:lstStyle/>
           <a:p>
+            <a:endParaRPr lang="en-US" dirty="0"/>
+          </a:p>
+        </p:txBody>
+      </p:sp>
+      <p:sp>
+        <p:nvSpPr>
+          <p:cNvPr id="4" name="Slide Number Placeholder 3"/>
+          <p:cNvSpPr>
+            <a:spLocks noGrp="1"/>
+          </p:cNvSpPr>
+          <p:nvPr>
+            <p:ph type="sldNum" sz="quarter" idx="10"/>
+          </p:nvPr>
+        </p:nvSpPr>
+        <p:spPr/>
+        <p:txBody>
+          <a:bodyPr/>
+          <a:lstStyle/>
+          <a:p>
+            <a:fld id="{F9A35D5F-9DC1-48C1-9A93-F2BBF67004F4}" type="slidenum">
+              <a:rPr lang="en-US" smtClean="0"/>
+              <a:t>29</a:t>
+            </a:fld>
+            <a:endParaRPr lang="en-US"/>
+          </a:p>
+        </p:txBody>
+      </p:sp>
+    </p:spTree>
+    <p:extLst>
+      <p:ext uri="{BB962C8B-B14F-4D97-AF65-F5344CB8AC3E}">
+        <p14:creationId xmlns:p14="http://schemas.microsoft.com/office/powerpoint/2010/main" val="387537523"/>
+      </p:ext>
+    </p:extLst>
+  </p:cSld>
+  <p:clrMapOvr>
+    <a:masterClrMapping/>
+  </p:clrMapOvr>
+</p:notes>
+</file>
+
+<file path=ppt/notesSlides/notesSlide22.xml><?xml version="1.0" encoding="utf-8"?>
+<p:notes xmlns:a="http://schemas.openxmlformats.org/drawingml/2006/main" xmlns:r="http://schemas.openxmlformats.org/officeDocument/2006/relationships" xmlns:p="http://schemas.openxmlformats.org/presentationml/2006/main">
+  <p:cSld>
+    <p:spTree>
+      <p:nvGrpSpPr>
+        <p:cNvPr id="1" name=""/>
+        <p:cNvGrpSpPr/>
+        <p:nvPr/>
+      </p:nvGrpSpPr>
+      <p:grpSpPr>
+        <a:xfrm>
+          <a:off x="0" y="0"/>
+          <a:ext cx="0" cy="0"/>
+          <a:chOff x="0" y="0"/>
+          <a:chExt cx="0" cy="0"/>
+        </a:xfrm>
+      </p:grpSpPr>
+      <p:sp>
+        <p:nvSpPr>
+          <p:cNvPr id="2" name="Slide Image Placeholder 1"/>
+          <p:cNvSpPr>
+            <a:spLocks noGrp="1" noRot="1" noChangeAspect="1"/>
+          </p:cNvSpPr>
+          <p:nvPr>
+            <p:ph type="sldImg"/>
+          </p:nvPr>
+        </p:nvSpPr>
+        <p:spPr/>
+      </p:sp>
+      <p:sp>
+        <p:nvSpPr>
+          <p:cNvPr id="3" name="Notes Placeholder 2"/>
+          <p:cNvSpPr>
+            <a:spLocks noGrp="1"/>
+          </p:cNvSpPr>
+          <p:nvPr>
+            <p:ph type="body" idx="1"/>
+          </p:nvPr>
+        </p:nvSpPr>
+        <p:spPr/>
+        <p:txBody>
+          <a:bodyPr/>
+          <a:lstStyle/>
+          <a:p>
+            <a:r>
+              <a:rPr lang="en-US" dirty="0" smtClean="0"/>
+              <a:t>Some of my favorite aliases and </a:t>
+            </a:r>
+            <a:r>
+              <a:rPr lang="en-US" dirty="0" err="1" smtClean="0"/>
+              <a:t>config</a:t>
+            </a:r>
+            <a:r>
+              <a:rPr lang="en-US" dirty="0" smtClean="0"/>
+              <a:t>.</a:t>
+            </a:r>
+            <a:r>
+              <a:rPr lang="en-US" baseline="0" dirty="0" smtClean="0"/>
+              <a:t> Notice editor=vim remember setting our editor earlier?</a:t>
+            </a:r>
+          </a:p>
+          <a:p>
             <a:endParaRPr lang="en-US" baseline="0" dirty="0" smtClean="0"/>
           </a:p>
           <a:p>
+            <a:r>
+              <a:rPr lang="en-US" dirty="0" smtClean="0"/>
+              <a:t>http://gitimmersion.com/lab_11.html</a:t>
+            </a:r>
+          </a:p>
+          <a:p>
+            <a:r>
+              <a:rPr lang="en-US" dirty="0" err="1" smtClean="0"/>
+              <a:t>hist</a:t>
+            </a:r>
+            <a:r>
+              <a:rPr lang="en-US" dirty="0" smtClean="0"/>
+              <a:t> = log --pretty=format:'%h %ad | %</a:t>
+            </a:r>
+            <a:r>
+              <a:rPr lang="en-US" dirty="0" err="1" smtClean="0"/>
+              <a:t>s%d</a:t>
+            </a:r>
+            <a:r>
+              <a:rPr lang="en-US" dirty="0" smtClean="0"/>
+              <a:t> [%an]' --graph --date=short</a:t>
+            </a:r>
+          </a:p>
+          <a:p>
+            <a:endParaRPr lang="en-US" dirty="0"/>
+          </a:p>
+        </p:txBody>
+      </p:sp>
+      <p:sp>
+        <p:nvSpPr>
+          <p:cNvPr id="4" name="Slide Number Placeholder 3"/>
+          <p:cNvSpPr>
+            <a:spLocks noGrp="1"/>
+          </p:cNvSpPr>
+          <p:nvPr>
+            <p:ph type="sldNum" sz="quarter" idx="10"/>
+          </p:nvPr>
+        </p:nvSpPr>
+        <p:spPr/>
+        <p:txBody>
+          <a:bodyPr/>
+          <a:lstStyle/>
+          <a:p>
+            <a:fld id="{F9A35D5F-9DC1-48C1-9A93-F2BBF67004F4}" type="slidenum">
+              <a:rPr lang="en-US" smtClean="0"/>
+              <a:t>30</a:t>
+            </a:fld>
+            <a:endParaRPr lang="en-US"/>
+          </a:p>
+        </p:txBody>
+      </p:sp>
+    </p:spTree>
+    <p:extLst>
+      <p:ext uri="{BB962C8B-B14F-4D97-AF65-F5344CB8AC3E}">
+        <p14:creationId xmlns:p14="http://schemas.microsoft.com/office/powerpoint/2010/main" val="1142608482"/>
+      </p:ext>
+    </p:extLst>
+  </p:cSld>
+  <p:clrMapOvr>
+    <a:masterClrMapping/>
+  </p:clrMapOvr>
+</p:notes>
+</file>
+
+<file path=ppt/notesSlides/notesSlide23.xml><?xml version="1.0" encoding="utf-8"?>
+<p:notes xmlns:a="http://schemas.openxmlformats.org/drawingml/2006/main" xmlns:r="http://schemas.openxmlformats.org/officeDocument/2006/relationships" xmlns:p="http://schemas.openxmlformats.org/presentationml/2006/main">
+  <p:cSld>
+    <p:spTree>
+      <p:nvGrpSpPr>
+        <p:cNvPr id="1" name=""/>
+        <p:cNvGrpSpPr/>
+        <p:nvPr/>
+      </p:nvGrpSpPr>
+      <p:grpSpPr>
+        <a:xfrm>
+          <a:off x="0" y="0"/>
+          <a:ext cx="0" cy="0"/>
+          <a:chOff x="0" y="0"/>
+          <a:chExt cx="0" cy="0"/>
+        </a:xfrm>
+      </p:grpSpPr>
+      <p:sp>
+        <p:nvSpPr>
+          <p:cNvPr id="2" name="Slide Image Placeholder 1"/>
+          <p:cNvSpPr>
+            <a:spLocks noGrp="1" noRot="1" noChangeAspect="1"/>
+          </p:cNvSpPr>
+          <p:nvPr>
+            <p:ph type="sldImg"/>
+          </p:nvPr>
+        </p:nvSpPr>
+        <p:spPr/>
+      </p:sp>
+      <p:sp>
+        <p:nvSpPr>
+          <p:cNvPr id="3" name="Notes Placeholder 2"/>
+          <p:cNvSpPr>
+            <a:spLocks noGrp="1"/>
+          </p:cNvSpPr>
+          <p:nvPr>
+            <p:ph type="body" idx="1"/>
+          </p:nvPr>
+        </p:nvSpPr>
+        <p:spPr/>
+        <p:txBody>
+          <a:bodyPr/>
+          <a:lstStyle/>
+          <a:p>
+            <a:r>
+              <a:rPr lang="en-US" dirty="0" smtClean="0"/>
+              <a:t>NOTE: </a:t>
+            </a:r>
+            <a:r>
+              <a:rPr lang="en-US" dirty="0" err="1" smtClean="0"/>
+              <a:t>git</a:t>
+            </a:r>
+            <a:r>
+              <a:rPr lang="en-US" dirty="0" smtClean="0"/>
+              <a:t> checkout -b &lt;</a:t>
+            </a:r>
+            <a:r>
+              <a:rPr lang="en-US" dirty="0" err="1" smtClean="0"/>
+              <a:t>branchname</a:t>
+            </a:r>
+            <a:r>
+              <a:rPr lang="en-US" dirty="0" smtClean="0"/>
+              <a:t>&gt; is a shortcut for </a:t>
+            </a:r>
+            <a:r>
+              <a:rPr lang="en-US" dirty="0" err="1" smtClean="0"/>
+              <a:t>git</a:t>
+            </a:r>
+            <a:r>
+              <a:rPr lang="en-US" dirty="0" smtClean="0"/>
+              <a:t> branch &lt;</a:t>
+            </a:r>
+            <a:r>
+              <a:rPr lang="en-US" dirty="0" err="1" smtClean="0"/>
+              <a:t>branchname</a:t>
+            </a:r>
+            <a:r>
+              <a:rPr lang="en-US" dirty="0" smtClean="0"/>
+              <a:t>&gt; followed by a </a:t>
+            </a:r>
+            <a:r>
+              <a:rPr lang="en-US" dirty="0" err="1" smtClean="0"/>
+              <a:t>git</a:t>
+            </a:r>
+            <a:r>
+              <a:rPr lang="en-US" dirty="0" smtClean="0"/>
+              <a:t> checkout &lt;</a:t>
+            </a:r>
+            <a:r>
+              <a:rPr lang="en-US" dirty="0" err="1" smtClean="0"/>
+              <a:t>branchname</a:t>
+            </a:r>
+            <a:r>
+              <a:rPr lang="en-US" dirty="0" smtClean="0"/>
+              <a:t>&gt;.</a:t>
+            </a:r>
+          </a:p>
+          <a:p>
+            <a:endParaRPr lang="en-US" dirty="0" smtClean="0"/>
+          </a:p>
+          <a:p>
+            <a:r>
+              <a:rPr lang="en-US" dirty="0" smtClean="0"/>
+              <a:t>Notice that the </a:t>
+            </a:r>
+            <a:r>
+              <a:rPr lang="en-US" dirty="0" err="1" smtClean="0"/>
+              <a:t>git</a:t>
+            </a:r>
+            <a:r>
+              <a:rPr lang="en-US" dirty="0" smtClean="0"/>
+              <a:t> status command reports that you are on the ‘greet’ branch.</a:t>
+            </a:r>
+          </a:p>
+          <a:p>
+            <a:r>
+              <a:rPr lang="en-US" dirty="0" smtClean="0"/>
+              <a:t>http://gitimmersion.com/lab_24.html</a:t>
+            </a:r>
+            <a:endParaRPr lang="en-US" dirty="0"/>
+          </a:p>
+        </p:txBody>
+      </p:sp>
+      <p:sp>
+        <p:nvSpPr>
+          <p:cNvPr id="4" name="Slide Number Placeholder 3"/>
+          <p:cNvSpPr>
+            <a:spLocks noGrp="1"/>
+          </p:cNvSpPr>
+          <p:nvPr>
+            <p:ph type="sldNum" sz="quarter" idx="10"/>
+          </p:nvPr>
+        </p:nvSpPr>
+        <p:spPr/>
+        <p:txBody>
+          <a:bodyPr/>
+          <a:lstStyle/>
+          <a:p>
+            <a:fld id="{F9A35D5F-9DC1-48C1-9A93-F2BBF67004F4}" type="slidenum">
+              <a:rPr lang="en-US" smtClean="0"/>
+              <a:t>33</a:t>
+            </a:fld>
+            <a:endParaRPr lang="en-US"/>
+          </a:p>
+        </p:txBody>
+      </p:sp>
+    </p:spTree>
+    <p:extLst>
+      <p:ext uri="{BB962C8B-B14F-4D97-AF65-F5344CB8AC3E}">
+        <p14:creationId xmlns:p14="http://schemas.microsoft.com/office/powerpoint/2010/main" val="4035100951"/>
+      </p:ext>
+    </p:extLst>
+  </p:cSld>
+  <p:clrMapOvr>
+    <a:masterClrMapping/>
+  </p:clrMapOvr>
+</p:notes>
+</file>
+
+<file path=ppt/notesSlides/notesSlide24.xml><?xml version="1.0" encoding="utf-8"?>
+<p:notes xmlns:a="http://schemas.openxmlformats.org/drawingml/2006/main" xmlns:r="http://schemas.openxmlformats.org/officeDocument/2006/relationships" xmlns:p="http://schemas.openxmlformats.org/presentationml/2006/main">
+  <p:cSld>
+    <p:spTree>
+      <p:nvGrpSpPr>
+        <p:cNvPr id="1" name=""/>
+        <p:cNvGrpSpPr/>
+        <p:nvPr/>
+      </p:nvGrpSpPr>
+      <p:grpSpPr>
+        <a:xfrm>
+          <a:off x="0" y="0"/>
+          <a:ext cx="0" cy="0"/>
+          <a:chOff x="0" y="0"/>
+          <a:chExt cx="0" cy="0"/>
+        </a:xfrm>
+      </p:grpSpPr>
+      <p:sp>
+        <p:nvSpPr>
+          <p:cNvPr id="2" name="Slide Image Placeholder 1"/>
+          <p:cNvSpPr>
+            <a:spLocks noGrp="1" noRot="1" noChangeAspect="1"/>
+          </p:cNvSpPr>
+          <p:nvPr>
+            <p:ph type="sldImg"/>
+          </p:nvPr>
+        </p:nvSpPr>
+        <p:spPr/>
+      </p:sp>
+      <p:sp>
+        <p:nvSpPr>
+          <p:cNvPr id="3" name="Notes Placeholder 2"/>
+          <p:cNvSpPr>
+            <a:spLocks noGrp="1"/>
+          </p:cNvSpPr>
+          <p:nvPr>
+            <p:ph type="body" idx="1"/>
+          </p:nvPr>
+        </p:nvSpPr>
+        <p:spPr/>
+        <p:txBody>
+          <a:bodyPr/>
+          <a:lstStyle/>
+          <a:p>
+            <a:r>
+              <a:rPr lang="en-US" dirty="0" smtClean="0"/>
+              <a:t>NOTE: </a:t>
+            </a:r>
+            <a:r>
+              <a:rPr lang="en-US" dirty="0" err="1" smtClean="0"/>
+              <a:t>git</a:t>
+            </a:r>
+            <a:r>
+              <a:rPr lang="en-US" dirty="0" smtClean="0"/>
+              <a:t> checkout -b &lt;</a:t>
+            </a:r>
+            <a:r>
+              <a:rPr lang="en-US" dirty="0" err="1" smtClean="0"/>
+              <a:t>branchname</a:t>
+            </a:r>
+            <a:r>
+              <a:rPr lang="en-US" dirty="0" smtClean="0"/>
+              <a:t>&gt; is a shortcut for </a:t>
+            </a:r>
+            <a:r>
+              <a:rPr lang="en-US" dirty="0" err="1" smtClean="0"/>
+              <a:t>git</a:t>
+            </a:r>
+            <a:r>
+              <a:rPr lang="en-US" dirty="0" smtClean="0"/>
+              <a:t> branch &lt;</a:t>
+            </a:r>
+            <a:r>
+              <a:rPr lang="en-US" dirty="0" err="1" smtClean="0"/>
+              <a:t>branchname</a:t>
+            </a:r>
+            <a:r>
+              <a:rPr lang="en-US" dirty="0" smtClean="0"/>
+              <a:t>&gt; followed by a </a:t>
+            </a:r>
+            <a:r>
+              <a:rPr lang="en-US" dirty="0" err="1" smtClean="0"/>
+              <a:t>git</a:t>
+            </a:r>
+            <a:r>
+              <a:rPr lang="en-US" dirty="0" smtClean="0"/>
+              <a:t> checkout &lt;</a:t>
+            </a:r>
+            <a:r>
+              <a:rPr lang="en-US" dirty="0" err="1" smtClean="0"/>
+              <a:t>branchname</a:t>
+            </a:r>
+            <a:r>
+              <a:rPr lang="en-US" dirty="0" smtClean="0"/>
+              <a:t>&gt;.</a:t>
+            </a:r>
+          </a:p>
+          <a:p>
+            <a:endParaRPr lang="en-US" dirty="0" smtClean="0"/>
+          </a:p>
+          <a:p>
+            <a:r>
+              <a:rPr lang="en-US" dirty="0" smtClean="0"/>
+              <a:t>Notice that the </a:t>
+            </a:r>
+            <a:r>
+              <a:rPr lang="en-US" dirty="0" err="1" smtClean="0"/>
+              <a:t>git</a:t>
+            </a:r>
+            <a:r>
+              <a:rPr lang="en-US" dirty="0" smtClean="0"/>
+              <a:t> status command reports that you are on the ‘greet’ branch.</a:t>
+            </a:r>
+          </a:p>
+          <a:p>
+            <a:r>
+              <a:rPr lang="en-US" dirty="0" smtClean="0"/>
+              <a:t>http://gitimmersion.com/lab_24.html</a:t>
+            </a:r>
+            <a:endParaRPr lang="en-US" dirty="0"/>
+          </a:p>
+        </p:txBody>
+      </p:sp>
+      <p:sp>
+        <p:nvSpPr>
+          <p:cNvPr id="4" name="Slide Number Placeholder 3"/>
+          <p:cNvSpPr>
+            <a:spLocks noGrp="1"/>
+          </p:cNvSpPr>
+          <p:nvPr>
+            <p:ph type="sldNum" sz="quarter" idx="10"/>
+          </p:nvPr>
+        </p:nvSpPr>
+        <p:spPr/>
+        <p:txBody>
+          <a:bodyPr/>
+          <a:lstStyle/>
+          <a:p>
+            <a:fld id="{F9A35D5F-9DC1-48C1-9A93-F2BBF67004F4}" type="slidenum">
+              <a:rPr lang="en-US" smtClean="0"/>
+              <a:t>34</a:t>
+            </a:fld>
+            <a:endParaRPr lang="en-US"/>
+          </a:p>
+        </p:txBody>
+      </p:sp>
+    </p:spTree>
+    <p:extLst>
+      <p:ext uri="{BB962C8B-B14F-4D97-AF65-F5344CB8AC3E}">
+        <p14:creationId xmlns:p14="http://schemas.microsoft.com/office/powerpoint/2010/main" val="4035100951"/>
+      </p:ext>
+    </p:extLst>
+  </p:cSld>
+  <p:clrMapOvr>
+    <a:masterClrMapping/>
+  </p:clrMapOvr>
+</p:notes>
+</file>
+
+<file path=ppt/notesSlides/notesSlide25.xml><?xml version="1.0" encoding="utf-8"?>
+<p:notes xmlns:a="http://schemas.openxmlformats.org/drawingml/2006/main" xmlns:r="http://schemas.openxmlformats.org/officeDocument/2006/relationships" xmlns:p="http://schemas.openxmlformats.org/presentationml/2006/main">
+  <p:cSld>
+    <p:spTree>
+      <p:nvGrpSpPr>
+        <p:cNvPr id="1" name=""/>
+        <p:cNvGrpSpPr/>
+        <p:nvPr/>
+      </p:nvGrpSpPr>
+      <p:grpSpPr>
+        <a:xfrm>
+          <a:off x="0" y="0"/>
+          <a:ext cx="0" cy="0"/>
+          <a:chOff x="0" y="0"/>
+          <a:chExt cx="0" cy="0"/>
+        </a:xfrm>
+      </p:grpSpPr>
+      <p:sp>
+        <p:nvSpPr>
+          <p:cNvPr id="2" name="Slide Image Placeholder 1"/>
+          <p:cNvSpPr>
+            <a:spLocks noGrp="1" noRot="1" noChangeAspect="1"/>
+          </p:cNvSpPr>
+          <p:nvPr>
+            <p:ph type="sldImg"/>
+          </p:nvPr>
+        </p:nvSpPr>
+        <p:spPr/>
+      </p:sp>
+      <p:sp>
+        <p:nvSpPr>
+          <p:cNvPr id="3" name="Notes Placeholder 2"/>
+          <p:cNvSpPr>
+            <a:spLocks noGrp="1"/>
+          </p:cNvSpPr>
+          <p:nvPr>
+            <p:ph type="body" idx="1"/>
+          </p:nvPr>
+        </p:nvSpPr>
+        <p:spPr/>
+        <p:txBody>
+          <a:bodyPr/>
+          <a:lstStyle/>
+          <a:p>
+            <a:r>
+              <a:rPr lang="en-US" dirty="0" smtClean="0"/>
+              <a:t>My advice: communicate as</a:t>
+            </a:r>
+            <a:r>
+              <a:rPr lang="en-US" baseline="0" dirty="0" smtClean="0"/>
+              <a:t> to avoid conflicts</a:t>
+            </a:r>
             <a:endParaRPr lang="en-US" dirty="0"/>
           </a:p>
         </p:txBody>
@@ -1928,6 +2476,177 @@
             <a:fld id="{F9A35D5F-9DC1-48C1-9A93-F2BBF67004F4}" type="slidenum">
               <a:rPr lang="en-US" smtClean="0"/>
               <a:t>35</a:t>
+            </a:fld>
+            <a:endParaRPr lang="en-US"/>
+          </a:p>
+        </p:txBody>
+      </p:sp>
+    </p:spTree>
+    <p:extLst>
+      <p:ext uri="{BB962C8B-B14F-4D97-AF65-F5344CB8AC3E}">
+        <p14:creationId xmlns:p14="http://schemas.microsoft.com/office/powerpoint/2010/main" val="1706169416"/>
+      </p:ext>
+    </p:extLst>
+  </p:cSld>
+  <p:clrMapOvr>
+    <a:masterClrMapping/>
+  </p:clrMapOvr>
+</p:notes>
+</file>
+
+<file path=ppt/notesSlides/notesSlide26.xml><?xml version="1.0" encoding="utf-8"?>
+<p:notes xmlns:a="http://schemas.openxmlformats.org/drawingml/2006/main" xmlns:r="http://schemas.openxmlformats.org/officeDocument/2006/relationships" xmlns:p="http://schemas.openxmlformats.org/presentationml/2006/main">
+  <p:cSld>
+    <p:spTree>
+      <p:nvGrpSpPr>
+        <p:cNvPr id="1" name=""/>
+        <p:cNvGrpSpPr/>
+        <p:nvPr/>
+      </p:nvGrpSpPr>
+      <p:grpSpPr>
+        <a:xfrm>
+          <a:off x="0" y="0"/>
+          <a:ext cx="0" cy="0"/>
+          <a:chOff x="0" y="0"/>
+          <a:chExt cx="0" cy="0"/>
+        </a:xfrm>
+      </p:grpSpPr>
+      <p:sp>
+        <p:nvSpPr>
+          <p:cNvPr id="2" name="Slide Image Placeholder 1"/>
+          <p:cNvSpPr>
+            <a:spLocks noGrp="1" noRot="1" noChangeAspect="1"/>
+          </p:cNvSpPr>
+          <p:nvPr>
+            <p:ph type="sldImg"/>
+          </p:nvPr>
+        </p:nvSpPr>
+        <p:spPr/>
+      </p:sp>
+      <p:sp>
+        <p:nvSpPr>
+          <p:cNvPr id="3" name="Notes Placeholder 2"/>
+          <p:cNvSpPr>
+            <a:spLocks noGrp="1"/>
+          </p:cNvSpPr>
+          <p:nvPr>
+            <p:ph type="body" idx="1"/>
+          </p:nvPr>
+        </p:nvSpPr>
+        <p:spPr/>
+        <p:txBody>
+          <a:bodyPr/>
+          <a:lstStyle/>
+          <a:p>
+            <a:endParaRPr lang="en-US" dirty="0"/>
+          </a:p>
+        </p:txBody>
+      </p:sp>
+      <p:sp>
+        <p:nvSpPr>
+          <p:cNvPr id="4" name="Slide Number Placeholder 3"/>
+          <p:cNvSpPr>
+            <a:spLocks noGrp="1"/>
+          </p:cNvSpPr>
+          <p:nvPr>
+            <p:ph type="sldNum" sz="quarter" idx="10"/>
+          </p:nvPr>
+        </p:nvSpPr>
+        <p:spPr/>
+        <p:txBody>
+          <a:bodyPr/>
+          <a:lstStyle/>
+          <a:p>
+            <a:fld id="{F9A35D5F-9DC1-48C1-9A93-F2BBF67004F4}" type="slidenum">
+              <a:rPr lang="en-US" smtClean="0"/>
+              <a:t>37</a:t>
+            </a:fld>
+            <a:endParaRPr lang="en-US"/>
+          </a:p>
+        </p:txBody>
+      </p:sp>
+    </p:spTree>
+    <p:extLst>
+      <p:ext uri="{BB962C8B-B14F-4D97-AF65-F5344CB8AC3E}">
+        <p14:creationId xmlns:p14="http://schemas.microsoft.com/office/powerpoint/2010/main" val="1706169416"/>
+      </p:ext>
+    </p:extLst>
+  </p:cSld>
+  <p:clrMapOvr>
+    <a:masterClrMapping/>
+  </p:clrMapOvr>
+</p:notes>
+</file>
+
+<file path=ppt/notesSlides/notesSlide27.xml><?xml version="1.0" encoding="utf-8"?>
+<p:notes xmlns:a="http://schemas.openxmlformats.org/drawingml/2006/main" xmlns:r="http://schemas.openxmlformats.org/officeDocument/2006/relationships" xmlns:p="http://schemas.openxmlformats.org/presentationml/2006/main">
+  <p:cSld>
+    <p:spTree>
+      <p:nvGrpSpPr>
+        <p:cNvPr id="1" name=""/>
+        <p:cNvGrpSpPr/>
+        <p:nvPr/>
+      </p:nvGrpSpPr>
+      <p:grpSpPr>
+        <a:xfrm>
+          <a:off x="0" y="0"/>
+          <a:ext cx="0" cy="0"/>
+          <a:chOff x="0" y="0"/>
+          <a:chExt cx="0" cy="0"/>
+        </a:xfrm>
+      </p:grpSpPr>
+      <p:sp>
+        <p:nvSpPr>
+          <p:cNvPr id="2" name="Slide Image Placeholder 1"/>
+          <p:cNvSpPr>
+            <a:spLocks noGrp="1" noRot="1" noChangeAspect="1"/>
+          </p:cNvSpPr>
+          <p:nvPr>
+            <p:ph type="sldImg"/>
+          </p:nvPr>
+        </p:nvSpPr>
+        <p:spPr/>
+      </p:sp>
+      <p:sp>
+        <p:nvSpPr>
+          <p:cNvPr id="3" name="Notes Placeholder 2"/>
+          <p:cNvSpPr>
+            <a:spLocks noGrp="1"/>
+          </p:cNvSpPr>
+          <p:nvPr>
+            <p:ph type="body" idx="1"/>
+          </p:nvPr>
+        </p:nvSpPr>
+        <p:spPr/>
+        <p:txBody>
+          <a:bodyPr/>
+          <a:lstStyle/>
+          <a:p>
+            <a:endParaRPr lang="en-US" baseline="0" dirty="0" smtClean="0"/>
+          </a:p>
+          <a:p>
+            <a:endParaRPr lang="en-US" dirty="0"/>
+          </a:p>
+        </p:txBody>
+      </p:sp>
+      <p:sp>
+        <p:nvSpPr>
+          <p:cNvPr id="4" name="Slide Number Placeholder 3"/>
+          <p:cNvSpPr>
+            <a:spLocks noGrp="1"/>
+          </p:cNvSpPr>
+          <p:nvPr>
+            <p:ph type="sldNum" sz="quarter" idx="10"/>
+          </p:nvPr>
+        </p:nvSpPr>
+        <p:spPr/>
+        <p:txBody>
+          <a:bodyPr/>
+          <a:lstStyle/>
+          <a:p>
+            <a:fld id="{F9A35D5F-9DC1-48C1-9A93-F2BBF67004F4}" type="slidenum">
+              <a:rPr lang="en-US" smtClean="0"/>
+              <a:t>39</a:t>
             </a:fld>
             <a:endParaRPr lang="en-US"/>
           </a:p>
@@ -3428,7 +4147,7 @@
           <a:p>
             <a:fld id="{F58B8D97-D35F-4FA6-9B95-54283A49CF2F}" type="datetime1">
               <a:rPr lang="en-US" smtClean="0"/>
-              <a:t>10/13/2015</a:t>
+              <a:t>10/14/2015</a:t>
             </a:fld>
             <a:endParaRPr lang="en-US" dirty="0"/>
           </a:p>
@@ -3682,7 +4401,7 @@
           <a:p>
             <a:fld id="{E4D20B51-4592-491D-AA33-A23D0CCF12BE}" type="datetime1">
               <a:rPr lang="en-US" smtClean="0"/>
-              <a:t>10/13/2015</a:t>
+              <a:t>10/14/2015</a:t>
             </a:fld>
             <a:endParaRPr lang="en-US" dirty="0"/>
           </a:p>
@@ -3992,7 +4711,7 @@
           <a:p>
             <a:fld id="{4E24EA0E-FDDC-4271-A7B5-863109D18CE3}" type="datetime1">
               <a:rPr lang="en-US" smtClean="0"/>
-              <a:t>10/13/2015</a:t>
+              <a:t>10/14/2015</a:t>
             </a:fld>
             <a:endParaRPr lang="en-US" dirty="0"/>
           </a:p>
@@ -4321,7 +5040,7 @@
           <a:p>
             <a:fld id="{F0228626-3549-480E-B0FC-729DD14405A8}" type="datetime1">
               <a:rPr lang="en-US" smtClean="0"/>
-              <a:t>10/13/2015</a:t>
+              <a:t>10/14/2015</a:t>
             </a:fld>
             <a:endParaRPr lang="en-US" dirty="0"/>
           </a:p>
@@ -4631,7 +5350,7 @@
           <a:p>
             <a:fld id="{BD53AD27-1EDB-4880-923B-AC27D9D28BCF}" type="datetime1">
               <a:rPr lang="en-US" smtClean="0"/>
-              <a:t>10/13/2015</a:t>
+              <a:t>10/14/2015</a:t>
             </a:fld>
             <a:endParaRPr lang="en-US" dirty="0"/>
           </a:p>
@@ -5020,7 +5739,7 @@
           <a:p>
             <a:fld id="{4643D882-98F0-4091-9720-109DBDEE8540}" type="datetime1">
               <a:rPr lang="en-US" smtClean="0"/>
-              <a:t>10/13/2015</a:t>
+              <a:t>10/14/2015</a:t>
             </a:fld>
             <a:endParaRPr lang="en-US" dirty="0"/>
           </a:p>
@@ -5186,7 +5905,7 @@
           <a:p>
             <a:fld id="{FB24CD86-D261-42B3-8CE1-21C866EAAD2E}" type="datetime1">
               <a:rPr lang="en-US" smtClean="0"/>
-              <a:t>10/13/2015</a:t>
+              <a:t>10/14/2015</a:t>
             </a:fld>
             <a:endParaRPr lang="en-US" dirty="0"/>
           </a:p>
@@ -5361,7 +6080,7 @@
           <a:p>
             <a:fld id="{99DC88BC-8D5E-4048-B2DE-A8E8CDC51830}" type="datetime1">
               <a:rPr lang="en-US" smtClean="0"/>
-              <a:t>10/13/2015</a:t>
+              <a:t>10/14/2015</a:t>
             </a:fld>
             <a:endParaRPr lang="en-US" dirty="0"/>
           </a:p>
@@ -5527,7 +6246,7 @@
           <a:p>
             <a:fld id="{429FAC85-2813-4766-9210-DAAC7425DA8D}" type="datetime1">
               <a:rPr lang="en-US" smtClean="0"/>
-              <a:t>10/13/2015</a:t>
+              <a:t>10/14/2015</a:t>
             </a:fld>
             <a:endParaRPr lang="en-US" dirty="0"/>
           </a:p>
@@ -5769,7 +6488,7 @@
           <a:p>
             <a:fld id="{5A04B50F-6609-40B4-8BE0-5D1E538F50AF}" type="datetime1">
               <a:rPr lang="en-US" smtClean="0"/>
-              <a:t>10/13/2015</a:t>
+              <a:t>10/14/2015</a:t>
             </a:fld>
             <a:endParaRPr lang="en-US" dirty="0"/>
           </a:p>
@@ -5997,7 +6716,7 @@
           <a:p>
             <a:fld id="{3AB540F2-BA07-429E-A547-62083BF6D5C1}" type="datetime1">
               <a:rPr lang="en-US" smtClean="0"/>
-              <a:t>10/13/2015</a:t>
+              <a:t>10/14/2015</a:t>
             </a:fld>
             <a:endParaRPr lang="en-US" dirty="0"/>
           </a:p>
@@ -6366,7 +7085,7 @@
           <a:p>
             <a:fld id="{22B51735-595B-430A-A2FC-3CB4C197B46C}" type="datetime1">
               <a:rPr lang="en-US" smtClean="0"/>
-              <a:t>10/13/2015</a:t>
+              <a:t>10/14/2015</a:t>
             </a:fld>
             <a:endParaRPr lang="en-US" dirty="0"/>
           </a:p>
@@ -6485,7 +7204,7 @@
           <a:p>
             <a:fld id="{5BFC0BE5-8114-4CBC-94F1-666FDE031CA4}" type="datetime1">
               <a:rPr lang="en-US" smtClean="0"/>
-              <a:t>10/13/2015</a:t>
+              <a:t>10/14/2015</a:t>
             </a:fld>
             <a:endParaRPr lang="en-US" dirty="0"/>
           </a:p>
@@ -6576,7 +7295,7 @@
           <a:p>
             <a:fld id="{396D05BB-E65F-4863-B3BC-9DDAD4C9F063}" type="datetime1">
               <a:rPr lang="en-US" smtClean="0"/>
-              <a:t>10/13/2015</a:t>
+              <a:t>10/14/2015</a:t>
             </a:fld>
             <a:endParaRPr lang="en-US" dirty="0"/>
           </a:p>
@@ -6827,7 +7546,7 @@
           <a:p>
             <a:fld id="{82789FFB-8503-451D-B269-1330C3D490C9}" type="datetime1">
               <a:rPr lang="en-US" smtClean="0"/>
-              <a:t>10/13/2015</a:t>
+              <a:t>10/14/2015</a:t>
             </a:fld>
             <a:endParaRPr lang="en-US" dirty="0"/>
           </a:p>
@@ -7128,7 +7847,7 @@
           <a:p>
             <a:fld id="{4D267C13-6D7C-4251-9688-CA233D311506}" type="datetime1">
               <a:rPr lang="en-US" smtClean="0"/>
-              <a:t>10/13/2015</a:t>
+              <a:t>10/14/2015</a:t>
             </a:fld>
             <a:endParaRPr lang="en-US" dirty="0"/>
           </a:p>
@@ -7825,7 +8544,7 @@
           <a:p>
             <a:fld id="{5C5EDA62-CBE6-4DB1-A7DC-3E8171C7E0E9}" type="datetime1">
               <a:rPr lang="en-US" smtClean="0"/>
-              <a:t>10/13/2015</a:t>
+              <a:t>10/14/2015</a:t>
             </a:fld>
             <a:endParaRPr lang="en-US" dirty="0"/>
           </a:p>
@@ -8386,11 +9105,7 @@
               <a:rPr lang="en-US" dirty="0" smtClean="0"/>
             </a:br>
             <a:r>
-              <a:rPr lang="en-US" dirty="0" smtClean="0"/>
-              <a:t> </a:t>
-            </a:r>
-            <a:r>
-              <a:rPr lang="en-US" sz="4400" dirty="0"/>
+              <a:rPr lang="en-US" sz="4400" dirty="0" smtClean="0"/>
               <a:t>with </a:t>
             </a:r>
             <a:r>
@@ -8853,6 +9568,47 @@
           </a:p>
         </p:txBody>
       </p:sp>
+      <p:pic>
+        <p:nvPicPr>
+          <p:cNvPr id="3074" name="Picture 2" descr="Z:\home\techplex\Desktop\sublimetext.png"/>
+          <p:cNvPicPr>
+            <a:picLocks noChangeAspect="1" noChangeArrowheads="1"/>
+          </p:cNvPicPr>
+          <p:nvPr/>
+        </p:nvPicPr>
+        <p:blipFill>
+          <a:blip r:embed="rId3">
+            <a:extLst>
+              <a:ext uri="{28A0092B-C50C-407E-A947-70E740481C1C}">
+                <a14:useLocalDpi xmlns:a14="http://schemas.microsoft.com/office/drawing/2010/main" val="0"/>
+              </a:ext>
+            </a:extLst>
+          </a:blip>
+          <a:srcRect/>
+          <a:stretch>
+            <a:fillRect/>
+          </a:stretch>
+        </p:blipFill>
+        <p:spPr bwMode="auto">
+          <a:xfrm>
+            <a:off x="6648449" y="1936496"/>
+            <a:ext cx="3305175" cy="3305175"/>
+          </a:xfrm>
+          <a:prstGeom prst="rect">
+            <a:avLst/>
+          </a:prstGeom>
+          <a:noFill/>
+          <a:extLst>
+            <a:ext uri="{909E8E84-426E-40DD-AFC4-6F175D3DCCD1}">
+              <a14:hiddenFill xmlns:a14="http://schemas.microsoft.com/office/drawing/2010/main">
+                <a:solidFill>
+                  <a:srgbClr val="FFFFFF"/>
+                </a:solidFill>
+              </a14:hiddenFill>
+            </a:ext>
+          </a:extLst>
+        </p:spPr>
+      </p:pic>
     </p:spTree>
     <p:extLst>
       <p:ext uri="{BB962C8B-B14F-4D97-AF65-F5344CB8AC3E}">
@@ -9254,10 +10010,10 @@
               <a:rPr lang="en-US" dirty="0" smtClean="0"/>
             </a:br>
             <a:r>
-              <a:rPr lang="en-US" sz="2400" dirty="0" smtClean="0"/>
+              <a:rPr lang="en-US" sz="2800" dirty="0" smtClean="0"/>
               <a:t>how else would you compile your code?</a:t>
             </a:r>
-            <a:endParaRPr lang="en-US" dirty="0"/>
+            <a:endParaRPr lang="en-US" sz="4000" dirty="0"/>
           </a:p>
         </p:txBody>
       </p:sp>
@@ -10234,6 +10990,47 @@
           </a:p>
         </p:txBody>
       </p:sp>
+      <p:pic>
+        <p:nvPicPr>
+          <p:cNvPr id="6146" name="Picture 2" descr="Z:\home\techplex\Desktop\options-512.png"/>
+          <p:cNvPicPr>
+            <a:picLocks noChangeAspect="1" noChangeArrowheads="1"/>
+          </p:cNvPicPr>
+          <p:nvPr/>
+        </p:nvPicPr>
+        <p:blipFill>
+          <a:blip r:embed="rId3">
+            <a:extLst>
+              <a:ext uri="{28A0092B-C50C-407E-A947-70E740481C1C}">
+                <a14:useLocalDpi xmlns:a14="http://schemas.microsoft.com/office/drawing/2010/main" val="0"/>
+              </a:ext>
+            </a:extLst>
+          </a:blip>
+          <a:srcRect/>
+          <a:stretch>
+            <a:fillRect/>
+          </a:stretch>
+        </p:blipFill>
+        <p:spPr bwMode="auto">
+          <a:xfrm>
+            <a:off x="7962900" y="2619375"/>
+            <a:ext cx="2438400" cy="2438400"/>
+          </a:xfrm>
+          <a:prstGeom prst="rect">
+            <a:avLst/>
+          </a:prstGeom>
+          <a:noFill/>
+          <a:extLst>
+            <a:ext uri="{909E8E84-426E-40DD-AFC4-6F175D3DCCD1}">
+              <a14:hiddenFill xmlns:a14="http://schemas.microsoft.com/office/drawing/2010/main">
+                <a:solidFill>
+                  <a:srgbClr val="FFFFFF"/>
+                </a:solidFill>
+              </a14:hiddenFill>
+            </a:ext>
+          </a:extLst>
+        </p:spPr>
+      </p:pic>
     </p:spTree>
     <p:extLst>
       <p:ext uri="{BB962C8B-B14F-4D97-AF65-F5344CB8AC3E}">
@@ -10541,10 +11338,10 @@
               <a:rPr lang="en-US" dirty="0" smtClean="0"/>
             </a:br>
             <a:r>
-              <a:rPr lang="en-US" sz="2400" dirty="0" smtClean="0"/>
+              <a:rPr lang="en-US" sz="2800" dirty="0" smtClean="0"/>
               <a:t>why can’t we all just agree and be friends</a:t>
             </a:r>
-            <a:endParaRPr lang="en-US" sz="4000" dirty="0"/>
+            <a:endParaRPr lang="en-US" sz="4400" dirty="0"/>
           </a:p>
         </p:txBody>
       </p:sp>
@@ -10940,26 +11737,26 @@
               <a:rPr lang="en-US" dirty="0" smtClean="0"/>
             </a:br>
             <a:r>
-              <a:rPr lang="en-US" sz="2400" dirty="0"/>
+              <a:rPr lang="en-US" sz="2800" dirty="0"/>
               <a:t>o</a:t>
             </a:r>
             <a:r>
-              <a:rPr lang="en-US" sz="2400" dirty="0" smtClean="0"/>
+              <a:rPr lang="en-US" sz="2800" dirty="0" smtClean="0"/>
               <a:t>r </a:t>
             </a:r>
             <a:r>
-              <a:rPr lang="en-US" sz="2400" dirty="0" err="1" smtClean="0"/>
+              <a:rPr lang="en-US" sz="2800" dirty="0" err="1" smtClean="0"/>
               <a:t>bitbucket</a:t>
             </a:r>
             <a:r>
-              <a:rPr lang="en-US" sz="2400" dirty="0" smtClean="0"/>
+              <a:rPr lang="en-US" sz="2800" dirty="0" smtClean="0"/>
               <a:t> or </a:t>
             </a:r>
             <a:r>
-              <a:rPr lang="en-US" sz="2400" dirty="0" err="1" smtClean="0"/>
+              <a:rPr lang="en-US" sz="2800" dirty="0" err="1" smtClean="0"/>
               <a:t>gitlab</a:t>
             </a:r>
-            <a:endParaRPr lang="en-US" sz="2400" dirty="0"/>
+            <a:endParaRPr lang="en-US" sz="2800" dirty="0"/>
           </a:p>
         </p:txBody>
       </p:sp>
@@ -11252,14 +12049,14 @@
               <a:rPr lang="en-US" dirty="0" smtClean="0"/>
             </a:br>
             <a:r>
-              <a:rPr lang="en-US" sz="2400" dirty="0" err="1" smtClean="0"/>
+              <a:rPr lang="en-US" sz="2800" dirty="0" err="1" smtClean="0"/>
               <a:t>ssh</a:t>
             </a:r>
             <a:r>
-              <a:rPr lang="en-US" sz="2400" dirty="0" smtClean="0"/>
+              <a:rPr lang="en-US" sz="2800" dirty="0" smtClean="0"/>
               <a:t> key identity that is</a:t>
             </a:r>
-            <a:endParaRPr lang="en-US" dirty="0"/>
+            <a:endParaRPr lang="en-US" sz="4000" dirty="0"/>
           </a:p>
         </p:txBody>
       </p:sp>
@@ -11276,7 +12073,7 @@
         <p:spPr/>
         <p:txBody>
           <a:bodyPr>
-            <a:normAutofit fontScale="92500"/>
+            <a:normAutofit lnSpcReduction="10000"/>
           </a:bodyPr>
           <a:lstStyle/>
           <a:p>
@@ -12121,10 +12918,10 @@
               <a:rPr lang="en-US" dirty="0" smtClean="0"/>
             </a:br>
             <a:r>
-              <a:rPr lang="en-US" sz="2400" dirty="0" smtClean="0"/>
+              <a:rPr lang="en-US" sz="2800" dirty="0" smtClean="0"/>
               <a:t>Overview</a:t>
             </a:r>
-            <a:endParaRPr lang="en-US" dirty="0"/>
+            <a:endParaRPr lang="en-US" sz="4000" dirty="0"/>
           </a:p>
         </p:txBody>
       </p:sp>
@@ -12587,10 +13384,10 @@
               <a:rPr lang="en-US" dirty="0" smtClean="0"/>
             </a:br>
             <a:r>
-              <a:rPr lang="en-US" sz="2400" dirty="0" smtClean="0"/>
+              <a:rPr lang="en-US" sz="2800" dirty="0" smtClean="0"/>
               <a:t>Starting</a:t>
             </a:r>
-            <a:endParaRPr lang="en-US" dirty="0"/>
+            <a:endParaRPr lang="en-US" sz="4000" dirty="0"/>
           </a:p>
         </p:txBody>
       </p:sp>
@@ -13109,10 +13906,10 @@
               <a:rPr lang="en-US" dirty="0" smtClean="0"/>
             </a:br>
             <a:r>
-              <a:rPr lang="en-US" sz="2400" dirty="0" smtClean="0"/>
+              <a:rPr lang="en-US" sz="2800" dirty="0" smtClean="0"/>
               <a:t>Staging &amp; Committing</a:t>
             </a:r>
-            <a:endParaRPr lang="en-US" dirty="0"/>
+            <a:endParaRPr lang="en-US" sz="4000" dirty="0"/>
           </a:p>
         </p:txBody>
       </p:sp>
@@ -13938,10 +14735,10 @@
               <a:rPr lang="en-US" dirty="0" smtClean="0"/>
             </a:br>
             <a:r>
-              <a:rPr lang="en-US" sz="2400" dirty="0" smtClean="0"/>
+              <a:rPr lang="en-US" sz="2800" dirty="0" smtClean="0"/>
               <a:t>Programming</a:t>
             </a:r>
-            <a:endParaRPr lang="en-US" dirty="0"/>
+            <a:endParaRPr lang="en-US" sz="4000" dirty="0"/>
           </a:p>
         </p:txBody>
       </p:sp>
@@ -14303,10 +15100,10 @@
               <a:rPr lang="en-US" dirty="0" smtClean="0"/>
             </a:br>
             <a:r>
-              <a:rPr lang="en-US" sz="2400" dirty="0" smtClean="0"/>
+              <a:rPr lang="en-US" sz="2800" dirty="0" smtClean="0"/>
               <a:t>Ignoring</a:t>
             </a:r>
-            <a:endParaRPr lang="en-US" dirty="0"/>
+            <a:endParaRPr lang="en-US" sz="4000" dirty="0"/>
           </a:p>
         </p:txBody>
       </p:sp>
@@ -14696,14 +15493,14 @@
               <a:rPr lang="en-US" dirty="0" smtClean="0"/>
             </a:br>
             <a:r>
-              <a:rPr lang="en-US" sz="2400" dirty="0"/>
+              <a:rPr lang="en-US" sz="2800" dirty="0"/>
               <a:t>C</a:t>
             </a:r>
             <a:r>
-              <a:rPr lang="en-US" sz="2400" dirty="0" smtClean="0"/>
+              <a:rPr lang="en-US" sz="2800" dirty="0" smtClean="0"/>
               <a:t>ommitting</a:t>
             </a:r>
-            <a:endParaRPr lang="en-US" dirty="0"/>
+            <a:endParaRPr lang="en-US" sz="4000" dirty="0"/>
           </a:p>
         </p:txBody>
       </p:sp>
@@ -15025,10 +15822,10 @@
               <a:rPr lang="en-US" dirty="0" smtClean="0"/>
             </a:br>
             <a:r>
-              <a:rPr lang="en-US" sz="2400" dirty="0" smtClean="0"/>
+              <a:rPr lang="en-US" sz="2800" dirty="0" smtClean="0"/>
               <a:t>More Committing</a:t>
             </a:r>
-            <a:endParaRPr lang="en-US" dirty="0"/>
+            <a:endParaRPr lang="en-US" sz="4000" dirty="0"/>
           </a:p>
         </p:txBody>
       </p:sp>
@@ -15336,16 +16133,106 @@
             <p:ph idx="1"/>
           </p:nvPr>
         </p:nvSpPr>
-        <p:spPr/>
-        <p:txBody>
-          <a:bodyPr/>
-          <a:lstStyle/>
-          <a:p>
-            <a:r>
-              <a:rPr lang="en-US" dirty="0" smtClean="0"/>
-              <a:t>Don’t forget about undoing local changes</a:t>
-            </a:r>
-            <a:endParaRPr lang="en-US" dirty="0"/>
+        <p:spPr>
+          <a:xfrm>
+            <a:off x="677334" y="1751014"/>
+            <a:ext cx="8596668" cy="2487611"/>
+          </a:xfrm>
+        </p:spPr>
+        <p:txBody>
+          <a:bodyPr>
+            <a:normAutofit fontScale="92500" lnSpcReduction="10000"/>
+          </a:bodyPr>
+          <a:lstStyle/>
+          <a:p>
+            <a:r>
+              <a:rPr lang="en-US" dirty="0" smtClean="0"/>
+              <a:t>Don’t forget about undoing local </a:t>
+            </a:r>
+            <a:r>
+              <a:rPr lang="en-US" dirty="0" smtClean="0"/>
+              <a:t>changes</a:t>
+            </a:r>
+          </a:p>
+          <a:p>
+            <a:pPr lvl="1">
+              <a:buSzPct val="110000"/>
+              <a:buFont typeface="Segoe UI" pitchFamily="34" charset="0"/>
+              <a:buChar char="$"/>
+            </a:pPr>
+            <a:r>
+              <a:rPr lang="en-US" dirty="0" err="1"/>
+              <a:t>g</a:t>
+            </a:r>
+            <a:r>
+              <a:rPr lang="en-US" dirty="0" err="1" smtClean="0"/>
+              <a:t>it</a:t>
+            </a:r>
+            <a:r>
+              <a:rPr lang="en-US" dirty="0" smtClean="0"/>
+              <a:t> checkout HEAD </a:t>
+            </a:r>
+            <a:r>
+              <a:rPr lang="en-US" i="1" dirty="0" smtClean="0"/>
+              <a:t>file(s)</a:t>
+            </a:r>
+          </a:p>
+          <a:p>
+            <a:pPr lvl="1">
+              <a:buSzPct val="110000"/>
+              <a:buFont typeface="Segoe UI" pitchFamily="34" charset="0"/>
+              <a:buChar char="$"/>
+            </a:pPr>
+            <a:r>
+              <a:rPr lang="en-US" dirty="0" err="1"/>
+              <a:t>g</a:t>
+            </a:r>
+            <a:r>
+              <a:rPr lang="en-US" dirty="0" err="1" smtClean="0"/>
+              <a:t>it</a:t>
+            </a:r>
+            <a:r>
+              <a:rPr lang="en-US" dirty="0" smtClean="0"/>
+              <a:t> checkout HEAD^ </a:t>
+            </a:r>
+            <a:r>
+              <a:rPr lang="en-US" i="1" dirty="0" smtClean="0"/>
+              <a:t>file(s)</a:t>
+            </a:r>
+          </a:p>
+          <a:p>
+            <a:pPr>
+              <a:buSzPct val="110000"/>
+            </a:pPr>
+            <a:endParaRPr lang="en-US" i="1" dirty="0"/>
+          </a:p>
+          <a:p>
+            <a:pPr>
+              <a:buSzPct val="110000"/>
+            </a:pPr>
+            <a:r>
+              <a:rPr lang="en-US" i="1" dirty="0" smtClean="0"/>
+              <a:t>HEAD = The current tip of the master</a:t>
+            </a:r>
+          </a:p>
+          <a:p>
+            <a:pPr>
+              <a:buSzPct val="110000"/>
+            </a:pPr>
+            <a:r>
+              <a:rPr lang="en-US" i="1" dirty="0" smtClean="0"/>
+              <a:t>HEAD~ = First parent of the tip of master</a:t>
+            </a:r>
+          </a:p>
+          <a:p>
+            <a:pPr>
+              <a:buSzPct val="110000"/>
+            </a:pPr>
+            <a:r>
+              <a:rPr lang="en-US" i="1" dirty="0" smtClean="0"/>
+              <a:t>HEAD~2 = First parent of the First Parent of the tip of master</a:t>
+            </a:r>
+            <a:endParaRPr lang="en-US" i="1" dirty="0"/>
           </a:p>
         </p:txBody>
       </p:sp>
@@ -15471,6 +16358,358 @@
               <a:rPr lang="en-US" smtClean="0"/>
               <a:t>27</a:t>
             </a:fld>
+            <a:endParaRPr lang="en-US" dirty="0"/>
+          </a:p>
+        </p:txBody>
+      </p:sp>
+      <p:sp>
+        <p:nvSpPr>
+          <p:cNvPr id="5" name="Rounded Rectangle 4"/>
+          <p:cNvSpPr/>
+          <p:nvPr/>
+        </p:nvSpPr>
+        <p:spPr>
+          <a:xfrm>
+            <a:off x="2919413" y="4552950"/>
+            <a:ext cx="1257300" cy="914400"/>
+          </a:xfrm>
+          <a:prstGeom prst="roundRect">
+            <a:avLst/>
+          </a:prstGeom>
+          <a:solidFill>
+            <a:srgbClr val="A4C2F4"/>
+          </a:solidFill>
+          <a:ln>
+            <a:solidFill>
+              <a:schemeClr val="tx1"/>
+            </a:solidFill>
+          </a:ln>
+        </p:spPr>
+        <p:style>
+          <a:lnRef idx="2">
+            <a:schemeClr val="accent1">
+              <a:shade val="50000"/>
+            </a:schemeClr>
+          </a:lnRef>
+          <a:fillRef idx="1">
+            <a:schemeClr val="accent1"/>
+          </a:fillRef>
+          <a:effectRef idx="0">
+            <a:schemeClr val="accent1"/>
+          </a:effectRef>
+          <a:fontRef idx="minor">
+            <a:schemeClr val="lt1"/>
+          </a:fontRef>
+        </p:style>
+        <p:txBody>
+          <a:bodyPr rtlCol="0" anchor="ctr"/>
+          <a:lstStyle/>
+          <a:p>
+            <a:pPr algn="ctr"/>
+            <a:r>
+              <a:rPr lang="en-US" dirty="0" smtClean="0">
+                <a:solidFill>
+                  <a:schemeClr val="tx1"/>
+                </a:solidFill>
+              </a:rPr>
+              <a:t>HEAD~</a:t>
+            </a:r>
+            <a:endParaRPr lang="en-US" sz="1600" dirty="0" smtClean="0">
+              <a:solidFill>
+                <a:schemeClr val="tx1"/>
+              </a:solidFill>
+            </a:endParaRPr>
+          </a:p>
+          <a:p>
+            <a:pPr algn="ctr"/>
+            <a:r>
+              <a:rPr lang="en-US" dirty="0" smtClean="0">
+                <a:solidFill>
+                  <a:schemeClr val="tx1"/>
+                </a:solidFill>
+              </a:rPr>
+              <a:t>HEAD~1</a:t>
+            </a:r>
+            <a:endParaRPr lang="en-US" dirty="0">
+              <a:solidFill>
+                <a:schemeClr val="tx1"/>
+              </a:solidFill>
+            </a:endParaRPr>
+          </a:p>
+        </p:txBody>
+      </p:sp>
+      <p:sp>
+        <p:nvSpPr>
+          <p:cNvPr id="7" name="Rounded Rectangle 6"/>
+          <p:cNvSpPr/>
+          <p:nvPr/>
+        </p:nvSpPr>
+        <p:spPr>
+          <a:xfrm>
+            <a:off x="1209675" y="4552950"/>
+            <a:ext cx="1257300" cy="914400"/>
+          </a:xfrm>
+          <a:prstGeom prst="roundRect">
+            <a:avLst/>
+          </a:prstGeom>
+          <a:solidFill>
+            <a:srgbClr val="A4C2F4"/>
+          </a:solidFill>
+          <a:ln>
+            <a:solidFill>
+              <a:schemeClr val="tx1"/>
+            </a:solidFill>
+          </a:ln>
+        </p:spPr>
+        <p:style>
+          <a:lnRef idx="2">
+            <a:schemeClr val="accent1">
+              <a:shade val="50000"/>
+            </a:schemeClr>
+          </a:lnRef>
+          <a:fillRef idx="1">
+            <a:schemeClr val="accent1"/>
+          </a:fillRef>
+          <a:effectRef idx="0">
+            <a:schemeClr val="accent1"/>
+          </a:effectRef>
+          <a:fontRef idx="minor">
+            <a:schemeClr val="lt1"/>
+          </a:fontRef>
+        </p:style>
+        <p:txBody>
+          <a:bodyPr rtlCol="0" anchor="ctr"/>
+          <a:lstStyle/>
+          <a:p>
+            <a:pPr algn="ctr"/>
+            <a:r>
+              <a:rPr lang="en-US" dirty="0" smtClean="0">
+                <a:solidFill>
+                  <a:schemeClr val="tx1"/>
+                </a:solidFill>
+              </a:rPr>
+              <a:t>HEAD~2</a:t>
+            </a:r>
+            <a:endParaRPr lang="en-US" dirty="0">
+              <a:solidFill>
+                <a:schemeClr val="tx1"/>
+              </a:solidFill>
+            </a:endParaRPr>
+          </a:p>
+        </p:txBody>
+      </p:sp>
+      <p:sp>
+        <p:nvSpPr>
+          <p:cNvPr id="8" name="Rounded Rectangle 7"/>
+          <p:cNvSpPr/>
+          <p:nvPr/>
+        </p:nvSpPr>
+        <p:spPr>
+          <a:xfrm>
+            <a:off x="4629150" y="4552950"/>
+            <a:ext cx="1257300" cy="914400"/>
+          </a:xfrm>
+          <a:prstGeom prst="roundRect">
+            <a:avLst/>
+          </a:prstGeom>
+          <a:solidFill>
+            <a:srgbClr val="A4C2F4"/>
+          </a:solidFill>
+          <a:ln>
+            <a:solidFill>
+              <a:schemeClr val="tx1"/>
+            </a:solidFill>
+          </a:ln>
+        </p:spPr>
+        <p:style>
+          <a:lnRef idx="2">
+            <a:schemeClr val="accent1">
+              <a:shade val="50000"/>
+            </a:schemeClr>
+          </a:lnRef>
+          <a:fillRef idx="1">
+            <a:schemeClr val="accent1"/>
+          </a:fillRef>
+          <a:effectRef idx="0">
+            <a:schemeClr val="accent1"/>
+          </a:effectRef>
+          <a:fontRef idx="minor">
+            <a:schemeClr val="lt1"/>
+          </a:fontRef>
+        </p:style>
+        <p:txBody>
+          <a:bodyPr rtlCol="0" anchor="ctr"/>
+          <a:lstStyle/>
+          <a:p>
+            <a:pPr algn="ctr"/>
+            <a:r>
+              <a:rPr lang="en-US" dirty="0" smtClean="0">
+                <a:solidFill>
+                  <a:schemeClr val="tx1"/>
+                </a:solidFill>
+              </a:rPr>
+              <a:t>HEAD</a:t>
+            </a:r>
+            <a:endParaRPr lang="en-US" dirty="0">
+              <a:solidFill>
+                <a:schemeClr val="tx1"/>
+              </a:solidFill>
+            </a:endParaRPr>
+          </a:p>
+        </p:txBody>
+      </p:sp>
+      <p:cxnSp>
+        <p:nvCxnSpPr>
+          <p:cNvPr id="10" name="Straight Arrow Connector 9"/>
+          <p:cNvCxnSpPr>
+            <a:stCxn id="5" idx="3"/>
+            <a:endCxn id="8" idx="1"/>
+          </p:cNvCxnSpPr>
+          <p:nvPr/>
+        </p:nvCxnSpPr>
+        <p:spPr>
+          <a:xfrm>
+            <a:off x="4176713" y="5010150"/>
+            <a:ext cx="452437" cy="0"/>
+          </a:xfrm>
+          <a:prstGeom prst="straightConnector1">
+            <a:avLst/>
+          </a:prstGeom>
+          <a:ln w="34925">
+            <a:solidFill>
+              <a:schemeClr val="tx2"/>
+            </a:solidFill>
+            <a:tailEnd type="arrow"/>
+          </a:ln>
+        </p:spPr>
+        <p:style>
+          <a:lnRef idx="1">
+            <a:schemeClr val="accent1"/>
+          </a:lnRef>
+          <a:fillRef idx="0">
+            <a:schemeClr val="accent1"/>
+          </a:fillRef>
+          <a:effectRef idx="0">
+            <a:schemeClr val="accent1"/>
+          </a:effectRef>
+          <a:fontRef idx="minor">
+            <a:schemeClr val="tx1"/>
+          </a:fontRef>
+        </p:style>
+      </p:cxnSp>
+      <p:cxnSp>
+        <p:nvCxnSpPr>
+          <p:cNvPr id="12" name="Straight Arrow Connector 11"/>
+          <p:cNvCxnSpPr>
+            <a:stCxn id="7" idx="3"/>
+            <a:endCxn id="5" idx="1"/>
+          </p:cNvCxnSpPr>
+          <p:nvPr/>
+        </p:nvCxnSpPr>
+        <p:spPr>
+          <a:xfrm>
+            <a:off x="2466975" y="5010150"/>
+            <a:ext cx="452438" cy="0"/>
+          </a:xfrm>
+          <a:prstGeom prst="straightConnector1">
+            <a:avLst/>
+          </a:prstGeom>
+          <a:ln w="34925">
+            <a:solidFill>
+              <a:schemeClr val="tx2"/>
+            </a:solidFill>
+            <a:tailEnd type="arrow"/>
+          </a:ln>
+        </p:spPr>
+        <p:style>
+          <a:lnRef idx="1">
+            <a:schemeClr val="accent1"/>
+          </a:lnRef>
+          <a:fillRef idx="0">
+            <a:schemeClr val="accent1"/>
+          </a:fillRef>
+          <a:effectRef idx="0">
+            <a:schemeClr val="accent1"/>
+          </a:effectRef>
+          <a:fontRef idx="minor">
+            <a:schemeClr val="tx1"/>
+          </a:fontRef>
+        </p:style>
+      </p:cxnSp>
+      <p:sp>
+        <p:nvSpPr>
+          <p:cNvPr id="13" name="Up Arrow 12"/>
+          <p:cNvSpPr/>
+          <p:nvPr/>
+        </p:nvSpPr>
+        <p:spPr>
+          <a:xfrm>
+            <a:off x="4888992" y="5467349"/>
+            <a:ext cx="737616" cy="600075"/>
+          </a:xfrm>
+          <a:prstGeom prst="upArrow">
+            <a:avLst/>
+          </a:prstGeom>
+          <a:solidFill>
+            <a:srgbClr val="A4C2F4"/>
+          </a:solidFill>
+          <a:ln>
+            <a:solidFill>
+              <a:schemeClr val="tx1"/>
+            </a:solidFill>
+          </a:ln>
+        </p:spPr>
+        <p:style>
+          <a:lnRef idx="2">
+            <a:schemeClr val="accent1">
+              <a:shade val="50000"/>
+            </a:schemeClr>
+          </a:lnRef>
+          <a:fillRef idx="1">
+            <a:schemeClr val="accent1"/>
+          </a:fillRef>
+          <a:effectRef idx="0">
+            <a:schemeClr val="accent1"/>
+          </a:effectRef>
+          <a:fontRef idx="minor">
+            <a:schemeClr val="lt1"/>
+          </a:fontRef>
+        </p:style>
+        <p:txBody>
+          <a:bodyPr rtlCol="0" anchor="ctr"/>
+          <a:lstStyle/>
+          <a:p>
+            <a:pPr algn="ctr"/>
+            <a:endParaRPr lang="en-US" dirty="0"/>
+          </a:p>
+        </p:txBody>
+      </p:sp>
+      <p:sp>
+        <p:nvSpPr>
+          <p:cNvPr id="14" name="TextBox 13"/>
+          <p:cNvSpPr txBox="1"/>
+          <p:nvPr/>
+        </p:nvSpPr>
+        <p:spPr>
+          <a:xfrm>
+            <a:off x="4812806" y="6178034"/>
+            <a:ext cx="889987" cy="369332"/>
+          </a:xfrm>
+          <a:prstGeom prst="rect">
+            <a:avLst/>
+          </a:prstGeom>
+          <a:noFill/>
+        </p:spPr>
+        <p:txBody>
+          <a:bodyPr wrap="none" rtlCol="0">
+            <a:spAutoFit/>
+          </a:bodyPr>
+          <a:lstStyle/>
+          <a:p>
+            <a:r>
+              <a:rPr lang="en-US" dirty="0" smtClean="0"/>
+              <a:t>Master</a:t>
+            </a:r>
             <a:endParaRPr lang="en-US" dirty="0"/>
           </a:p>
         </p:txBody>
@@ -15724,15 +16963,15 @@
               <a:rPr lang="en-US" dirty="0"/>
             </a:br>
             <a:r>
-              <a:rPr lang="en-US" sz="2400" dirty="0"/>
+              <a:rPr lang="en-US" sz="2800" dirty="0"/>
               <a:t>The magic of </a:t>
             </a:r>
             <a:r>
-              <a:rPr lang="en-US" sz="2400" dirty="0" err="1"/>
+              <a:rPr lang="en-US" sz="2800" dirty="0" err="1"/>
               <a:t>git</a:t>
             </a:r>
             <a:r>
-              <a:rPr lang="en-US" sz="2400" dirty="0"/>
+              <a:rPr lang="en-US" sz="2800" dirty="0"/>
               <a:t>-number</a:t>
             </a:r>
           </a:p>
@@ -16696,7 +17935,7 @@
               <a:rPr lang="en-US" dirty="0" smtClean="0"/>
             </a:br>
             <a:r>
-              <a:rPr lang="en-US" sz="2400" dirty="0" smtClean="0"/>
+              <a:rPr lang="en-US" sz="2800" dirty="0" smtClean="0"/>
               <a:t>Making aliases for fun and profit</a:t>
             </a:r>
             <a:endParaRPr lang="en-US" dirty="0"/>
@@ -16735,7 +17974,7 @@
           <p:nvPr/>
         </p:nvPicPr>
         <p:blipFill>
-          <a:blip r:embed="rId2"/>
+          <a:blip r:embed="rId3"/>
           <a:stretch>
             <a:fillRect/>
           </a:stretch>
@@ -16940,10 +18179,10 @@
               <a:rPr lang="en-US" dirty="0" smtClean="0"/>
             </a:br>
             <a:r>
-              <a:rPr lang="en-US" sz="2400" dirty="0" smtClean="0"/>
+              <a:rPr lang="en-US" sz="2800" dirty="0" smtClean="0"/>
               <a:t>Using aliases for fun and profit</a:t>
             </a:r>
-            <a:endParaRPr lang="en-US" dirty="0"/>
+            <a:endParaRPr lang="en-US" sz="4000" dirty="0"/>
           </a:p>
         </p:txBody>
       </p:sp>
@@ -17092,6 +18331,70 @@
           </a:p>
         </p:txBody>
       </p:sp>
+      <p:pic>
+        <p:nvPicPr>
+          <p:cNvPr id="1027" name="Picture 3"/>
+          <p:cNvPicPr>
+            <a:picLocks noChangeAspect="1" noChangeArrowheads="1"/>
+          </p:cNvPicPr>
+          <p:nvPr/>
+        </p:nvPicPr>
+        <p:blipFill>
+          <a:blip r:embed="rId2">
+            <a:extLst>
+              <a:ext uri="{28A0092B-C50C-407E-A947-70E740481C1C}">
+                <a14:useLocalDpi xmlns:a14="http://schemas.microsoft.com/office/drawing/2010/main" val="0"/>
+              </a:ext>
+            </a:extLst>
+          </a:blip>
+          <a:srcRect/>
+          <a:stretch>
+            <a:fillRect/>
+          </a:stretch>
+        </p:blipFill>
+        <p:spPr bwMode="auto">
+          <a:xfrm>
+            <a:off x="571500" y="1780921"/>
+            <a:ext cx="6267450" cy="3486150"/>
+          </a:xfrm>
+          <a:prstGeom prst="rect">
+            <a:avLst/>
+          </a:prstGeom>
+          <a:noFill/>
+          <a:ln>
+            <a:noFill/>
+          </a:ln>
+          <a:effectLst/>
+          <a:extLst>
+            <a:ext uri="{909E8E84-426E-40DD-AFC4-6F175D3DCCD1}">
+              <a14:hiddenFill xmlns:a14="http://schemas.microsoft.com/office/drawing/2010/main">
+                <a:solidFill>
+                  <a:schemeClr val="accent1"/>
+                </a:solidFill>
+              </a14:hiddenFill>
+            </a:ext>
+            <a:ext uri="{91240B29-F687-4F45-9708-019B960494DF}">
+              <a14:hiddenLine xmlns:a14="http://schemas.microsoft.com/office/drawing/2010/main" w="9525">
+                <a:solidFill>
+                  <a:schemeClr val="tx1"/>
+                </a:solidFill>
+                <a:miter lim="800000"/>
+                <a:headEnd/>
+                <a:tailEnd/>
+              </a14:hiddenLine>
+            </a:ext>
+            <a:ext uri="{AF507438-7753-43E0-B8FC-AC1667EBCBE1}">
+              <a14:hiddenEffects xmlns:a14="http://schemas.microsoft.com/office/drawing/2010/main">
+                <a:effectLst>
+                  <a:outerShdw dist="35921" dir="2700000" algn="ctr" rotWithShape="0">
+                    <a:schemeClr val="bg2"/>
+                  </a:outerShdw>
+                </a:effectLst>
+              </a14:hiddenEffects>
+            </a:ext>
+          </a:extLst>
+        </p:spPr>
+      </p:pic>
     </p:spTree>
     <p:extLst>
       <p:ext uri="{BB962C8B-B14F-4D97-AF65-F5344CB8AC3E}">
@@ -17233,7 +18536,7 @@
         </p:blipFill>
         <p:spPr bwMode="auto">
           <a:xfrm>
-            <a:off x="6762307" y="160520"/>
+            <a:off x="6762307" y="122420"/>
             <a:ext cx="4251250" cy="3177810"/>
           </a:xfrm>
           <a:prstGeom prst="rect">
@@ -17259,8 +18562,8 @@
         </p:nvSpPr>
         <p:spPr>
           <a:xfrm>
-            <a:off x="8263909" y="3444948"/>
-            <a:ext cx="1739556" cy="1318391"/>
+            <a:off x="7800186" y="3444947"/>
+            <a:ext cx="2175491" cy="1574727"/>
           </a:xfrm>
           <a:prstGeom prst="upArrow">
             <a:avLst/>
@@ -17361,86 +18664,238 @@
             <a:spLocks noGrp="1"/>
           </p:cNvSpPr>
           <p:nvPr>
-            <p:ph type="ctrTitle"/>
+            <p:ph type="title"/>
           </p:nvPr>
         </p:nvSpPr>
         <p:spPr/>
         <p:txBody>
+          <a:bodyPr>
+            <a:normAutofit/>
+          </a:bodyPr>
+          <a:lstStyle/>
+          <a:p>
+            <a:r>
+              <a:rPr lang="en-US" dirty="0" smtClean="0"/>
+              <a:t>Creating branches</a:t>
+            </a:r>
+            <a:endParaRPr lang="en-US" dirty="0" smtClean="0"/>
+          </a:p>
+        </p:txBody>
+      </p:sp>
+      <p:sp>
+        <p:nvSpPr>
+          <p:cNvPr id="4" name="Slide Number Placeholder 3"/>
+          <p:cNvSpPr>
+            <a:spLocks noGrp="1"/>
+          </p:cNvSpPr>
+          <p:nvPr>
+            <p:ph type="sldNum" sz="quarter" idx="12"/>
+          </p:nvPr>
+        </p:nvSpPr>
+        <p:spPr/>
+        <p:txBody>
           <a:bodyPr/>
           <a:lstStyle/>
           <a:p>
-            <a:pPr algn="l"/>
-            <a:r>
-              <a:rPr lang="en-US" dirty="0" smtClean="0"/>
-              <a:t>Module 5: </a:t>
-            </a:r>
-            <a:r>
-              <a:rPr lang="en-US" dirty="0"/>
-              <a:t/>
-            </a:r>
-            <a:br>
-              <a:rPr lang="en-US" dirty="0"/>
-            </a:br>
-            <a:r>
-              <a:rPr lang="en-US" dirty="0" smtClean="0"/>
-              <a:t>Collaborating</a:t>
-            </a:r>
-            <a:endParaRPr lang="en-US" dirty="0"/>
-          </a:p>
-        </p:txBody>
-      </p:sp>
-      <p:sp>
-        <p:nvSpPr>
-          <p:cNvPr id="3" name="Subtitle 2"/>
-          <p:cNvSpPr>
-            <a:spLocks noGrp="1"/>
-          </p:cNvSpPr>
-          <p:nvPr>
-            <p:ph type="subTitle" idx="1"/>
-          </p:nvPr>
-        </p:nvSpPr>
-        <p:spPr/>
-        <p:txBody>
-          <a:bodyPr/>
-          <a:lstStyle/>
-          <a:p>
-            <a:pPr algn="l"/>
-            <a:r>
-              <a:rPr lang="en-US" dirty="0" smtClean="0"/>
-              <a:t>Type less. Do more.</a:t>
-            </a:r>
-            <a:endParaRPr lang="en-US" dirty="0"/>
-          </a:p>
-        </p:txBody>
-      </p:sp>
-      <p:sp>
-        <p:nvSpPr>
-          <p:cNvPr id="4" name="Slide Number Placeholder 3"/>
-          <p:cNvSpPr>
-            <a:spLocks noGrp="1"/>
-          </p:cNvSpPr>
-          <p:nvPr>
-            <p:ph type="sldNum" sz="quarter" idx="12"/>
-          </p:nvPr>
-        </p:nvSpPr>
-        <p:spPr/>
-        <p:txBody>
-          <a:bodyPr/>
-          <a:lstStyle/>
-          <a:p>
-            <a:fld id="{D57F1E4F-1CFF-5643-939E-217C01CDF565}" type="slidenum">
+            <a:fld id="{519954A3-9DFD-4C44-94BA-B95130A3BA1C}" type="slidenum">
               <a:rPr lang="en-US" smtClean="0"/>
-              <a:pPr/>
               <a:t>33</a:t>
             </a:fld>
             <a:endParaRPr lang="en-US" dirty="0"/>
           </a:p>
         </p:txBody>
       </p:sp>
+      <p:sp>
+        <p:nvSpPr>
+          <p:cNvPr id="6" name="Title 1"/>
+          <p:cNvSpPr txBox="1">
+            <a:spLocks/>
+          </p:cNvSpPr>
+          <p:nvPr/>
+        </p:nvSpPr>
+        <p:spPr>
+          <a:xfrm>
+            <a:off x="7735824" y="615696"/>
+            <a:ext cx="1538178" cy="1320800"/>
+          </a:xfrm>
+          <a:prstGeom prst="rect">
+            <a:avLst/>
+          </a:prstGeom>
+        </p:spPr>
+        <p:txBody>
+          <a:bodyPr vert="horz" lIns="91440" tIns="45720" rIns="91440" bIns="45720" rtlCol="0" anchor="t">
+            <a:normAutofit/>
+          </a:bodyPr>
+          <a:lstStyle>
+            <a:lvl1pPr algn="l" defTabSz="457200" rtl="0" eaLnBrk="1" latinLnBrk="0" hangingPunct="1">
+              <a:spcBef>
+                <a:spcPct val="0"/>
+              </a:spcBef>
+              <a:buNone/>
+              <a:defRPr sz="3600" kern="1200">
+                <a:solidFill>
+                  <a:schemeClr val="accent1"/>
+                </a:solidFill>
+                <a:latin typeface="+mj-lt"/>
+                <a:ea typeface="+mj-ea"/>
+                <a:cs typeface="+mj-cs"/>
+              </a:defRPr>
+            </a:lvl1pPr>
+            <a:lvl2pPr eaLnBrk="1" hangingPunct="1">
+              <a:defRPr>
+                <a:solidFill>
+                  <a:schemeClr val="tx2"/>
+                </a:solidFill>
+              </a:defRPr>
+            </a:lvl2pPr>
+            <a:lvl3pPr eaLnBrk="1" hangingPunct="1">
+              <a:defRPr>
+                <a:solidFill>
+                  <a:schemeClr val="tx2"/>
+                </a:solidFill>
+              </a:defRPr>
+            </a:lvl3pPr>
+            <a:lvl4pPr eaLnBrk="1" hangingPunct="1">
+              <a:defRPr>
+                <a:solidFill>
+                  <a:schemeClr val="tx2"/>
+                </a:solidFill>
+              </a:defRPr>
+            </a:lvl4pPr>
+            <a:lvl5pPr eaLnBrk="1" hangingPunct="1">
+              <a:defRPr>
+                <a:solidFill>
+                  <a:schemeClr val="tx2"/>
+                </a:solidFill>
+              </a:defRPr>
+            </a:lvl5pPr>
+            <a:lvl6pPr eaLnBrk="1" hangingPunct="1">
+              <a:defRPr>
+                <a:solidFill>
+                  <a:schemeClr val="tx2"/>
+                </a:solidFill>
+              </a:defRPr>
+            </a:lvl6pPr>
+            <a:lvl7pPr eaLnBrk="1" hangingPunct="1">
+              <a:defRPr>
+                <a:solidFill>
+                  <a:schemeClr val="tx2"/>
+                </a:solidFill>
+              </a:defRPr>
+            </a:lvl7pPr>
+            <a:lvl8pPr eaLnBrk="1" hangingPunct="1">
+              <a:defRPr>
+                <a:solidFill>
+                  <a:schemeClr val="tx2"/>
+                </a:solidFill>
+              </a:defRPr>
+            </a:lvl8pPr>
+            <a:lvl9pPr eaLnBrk="1" hangingPunct="1">
+              <a:defRPr>
+                <a:solidFill>
+                  <a:schemeClr val="tx2"/>
+                </a:solidFill>
+              </a:defRPr>
+            </a:lvl9pPr>
+          </a:lstStyle>
+          <a:p>
+            <a:pPr algn="ctr"/>
+            <a:r>
+              <a:rPr lang="en-US" sz="6000" dirty="0" smtClean="0"/>
+              <a:t>4.1</a:t>
+            </a:r>
+            <a:endParaRPr lang="en-US" sz="6000" dirty="0"/>
+          </a:p>
+        </p:txBody>
+      </p:sp>
+      <p:sp>
+        <p:nvSpPr>
+          <p:cNvPr id="7" name="Content Placeholder 6"/>
+          <p:cNvSpPr>
+            <a:spLocks noGrp="1"/>
+          </p:cNvSpPr>
+          <p:nvPr>
+            <p:ph idx="1"/>
+          </p:nvPr>
+        </p:nvSpPr>
+        <p:spPr/>
+        <p:txBody>
+          <a:bodyPr/>
+          <a:lstStyle/>
+          <a:p>
+            <a:r>
+              <a:rPr lang="en-US" dirty="0" err="1" smtClean="0"/>
+              <a:t>Git</a:t>
+            </a:r>
+            <a:r>
+              <a:rPr lang="en-US" dirty="0" smtClean="0"/>
+              <a:t> </a:t>
+            </a:r>
+            <a:r>
+              <a:rPr lang="en-US" dirty="0" err="1" smtClean="0"/>
+              <a:t>nb</a:t>
+            </a:r>
+            <a:r>
+              <a:rPr lang="en-US" dirty="0" smtClean="0"/>
+              <a:t> </a:t>
+            </a:r>
+            <a:r>
+              <a:rPr lang="en-US" dirty="0" err="1" smtClean="0"/>
+              <a:t>branch_name</a:t>
+            </a:r>
+            <a:endParaRPr lang="en-US" dirty="0" smtClean="0"/>
+          </a:p>
+          <a:p>
+            <a:r>
+              <a:rPr lang="en-US" dirty="0" err="1" smtClean="0"/>
+              <a:t>Git</a:t>
+            </a:r>
+            <a:r>
+              <a:rPr lang="en-US" dirty="0" smtClean="0"/>
+              <a:t> checkout –b </a:t>
+            </a:r>
+            <a:r>
+              <a:rPr lang="en-US" dirty="0" err="1" smtClean="0"/>
+              <a:t>branch_name</a:t>
+            </a:r>
+            <a:endParaRPr lang="en-US" dirty="0" smtClean="0"/>
+          </a:p>
+          <a:p>
+            <a:r>
+              <a:rPr lang="en-US" dirty="0" err="1" smtClean="0"/>
+              <a:t>Git</a:t>
+            </a:r>
+            <a:r>
+              <a:rPr lang="en-US" dirty="0" smtClean="0"/>
+              <a:t> branch </a:t>
+            </a:r>
+            <a:r>
+              <a:rPr lang="en-US" dirty="0" err="1" smtClean="0"/>
+              <a:t>branch_name</a:t>
+            </a:r>
+            <a:endParaRPr lang="en-US" dirty="0" smtClean="0"/>
+          </a:p>
+          <a:p>
+            <a:r>
+              <a:rPr lang="en-US" dirty="0" err="1" smtClean="0"/>
+              <a:t>Git</a:t>
+            </a:r>
+            <a:r>
+              <a:rPr lang="en-US" dirty="0" smtClean="0"/>
+              <a:t> checkout </a:t>
+            </a:r>
+            <a:r>
+              <a:rPr lang="en-US" dirty="0" err="1" smtClean="0"/>
+              <a:t>branch_name</a:t>
+            </a:r>
+            <a:endParaRPr lang="en-US" dirty="0"/>
+          </a:p>
+        </p:txBody>
+      </p:sp>
     </p:spTree>
     <p:extLst>
       <p:ext uri="{BB962C8B-B14F-4D97-AF65-F5344CB8AC3E}">
-        <p14:creationId xmlns:p14="http://schemas.microsoft.com/office/powerpoint/2010/main" val="3938132744"/>
+        <p14:creationId xmlns:p14="http://schemas.microsoft.com/office/powerpoint/2010/main" val="3212819003"/>
       </p:ext>
     </p:extLst>
   </p:cSld>
@@ -17481,6 +18936,933 @@
             <a:spLocks noGrp="1"/>
           </p:cNvSpPr>
           <p:nvPr>
+            <p:ph type="title"/>
+          </p:nvPr>
+        </p:nvSpPr>
+        <p:spPr/>
+        <p:txBody>
+          <a:bodyPr>
+            <a:normAutofit/>
+          </a:bodyPr>
+          <a:lstStyle/>
+          <a:p>
+            <a:r>
+              <a:rPr lang="en-US" dirty="0" smtClean="0"/>
+              <a:t>Navigating branches</a:t>
+            </a:r>
+            <a:endParaRPr lang="en-US" dirty="0" smtClean="0"/>
+          </a:p>
+        </p:txBody>
+      </p:sp>
+      <p:sp>
+        <p:nvSpPr>
+          <p:cNvPr id="4" name="Slide Number Placeholder 3"/>
+          <p:cNvSpPr>
+            <a:spLocks noGrp="1"/>
+          </p:cNvSpPr>
+          <p:nvPr>
+            <p:ph type="sldNum" sz="quarter" idx="12"/>
+          </p:nvPr>
+        </p:nvSpPr>
+        <p:spPr/>
+        <p:txBody>
+          <a:bodyPr/>
+          <a:lstStyle/>
+          <a:p>
+            <a:fld id="{519954A3-9DFD-4C44-94BA-B95130A3BA1C}" type="slidenum">
+              <a:rPr lang="en-US" smtClean="0"/>
+              <a:t>34</a:t>
+            </a:fld>
+            <a:endParaRPr lang="en-US" dirty="0"/>
+          </a:p>
+        </p:txBody>
+      </p:sp>
+      <p:sp>
+        <p:nvSpPr>
+          <p:cNvPr id="6" name="Title 1"/>
+          <p:cNvSpPr txBox="1">
+            <a:spLocks/>
+          </p:cNvSpPr>
+          <p:nvPr/>
+        </p:nvSpPr>
+        <p:spPr>
+          <a:xfrm>
+            <a:off x="7735824" y="615696"/>
+            <a:ext cx="1538178" cy="1320800"/>
+          </a:xfrm>
+          <a:prstGeom prst="rect">
+            <a:avLst/>
+          </a:prstGeom>
+        </p:spPr>
+        <p:txBody>
+          <a:bodyPr vert="horz" lIns="91440" tIns="45720" rIns="91440" bIns="45720" rtlCol="0" anchor="t">
+            <a:normAutofit/>
+          </a:bodyPr>
+          <a:lstStyle>
+            <a:lvl1pPr algn="l" defTabSz="457200" rtl="0" eaLnBrk="1" latinLnBrk="0" hangingPunct="1">
+              <a:spcBef>
+                <a:spcPct val="0"/>
+              </a:spcBef>
+              <a:buNone/>
+              <a:defRPr sz="3600" kern="1200">
+                <a:solidFill>
+                  <a:schemeClr val="accent1"/>
+                </a:solidFill>
+                <a:latin typeface="+mj-lt"/>
+                <a:ea typeface="+mj-ea"/>
+                <a:cs typeface="+mj-cs"/>
+              </a:defRPr>
+            </a:lvl1pPr>
+            <a:lvl2pPr eaLnBrk="1" hangingPunct="1">
+              <a:defRPr>
+                <a:solidFill>
+                  <a:schemeClr val="tx2"/>
+                </a:solidFill>
+              </a:defRPr>
+            </a:lvl2pPr>
+            <a:lvl3pPr eaLnBrk="1" hangingPunct="1">
+              <a:defRPr>
+                <a:solidFill>
+                  <a:schemeClr val="tx2"/>
+                </a:solidFill>
+              </a:defRPr>
+            </a:lvl3pPr>
+            <a:lvl4pPr eaLnBrk="1" hangingPunct="1">
+              <a:defRPr>
+                <a:solidFill>
+                  <a:schemeClr val="tx2"/>
+                </a:solidFill>
+              </a:defRPr>
+            </a:lvl4pPr>
+            <a:lvl5pPr eaLnBrk="1" hangingPunct="1">
+              <a:defRPr>
+                <a:solidFill>
+                  <a:schemeClr val="tx2"/>
+                </a:solidFill>
+              </a:defRPr>
+            </a:lvl5pPr>
+            <a:lvl6pPr eaLnBrk="1" hangingPunct="1">
+              <a:defRPr>
+                <a:solidFill>
+                  <a:schemeClr val="tx2"/>
+                </a:solidFill>
+              </a:defRPr>
+            </a:lvl6pPr>
+            <a:lvl7pPr eaLnBrk="1" hangingPunct="1">
+              <a:defRPr>
+                <a:solidFill>
+                  <a:schemeClr val="tx2"/>
+                </a:solidFill>
+              </a:defRPr>
+            </a:lvl7pPr>
+            <a:lvl8pPr eaLnBrk="1" hangingPunct="1">
+              <a:defRPr>
+                <a:solidFill>
+                  <a:schemeClr val="tx2"/>
+                </a:solidFill>
+              </a:defRPr>
+            </a:lvl8pPr>
+            <a:lvl9pPr eaLnBrk="1" hangingPunct="1">
+              <a:defRPr>
+                <a:solidFill>
+                  <a:schemeClr val="tx2"/>
+                </a:solidFill>
+              </a:defRPr>
+            </a:lvl9pPr>
+          </a:lstStyle>
+          <a:p>
+            <a:pPr algn="ctr"/>
+            <a:r>
+              <a:rPr lang="en-US" sz="6000" dirty="0" smtClean="0"/>
+              <a:t>4.2</a:t>
+            </a:r>
+            <a:endParaRPr lang="en-US" sz="6000" dirty="0"/>
+          </a:p>
+        </p:txBody>
+      </p:sp>
+      <p:sp>
+        <p:nvSpPr>
+          <p:cNvPr id="7" name="Content Placeholder 6"/>
+          <p:cNvSpPr>
+            <a:spLocks noGrp="1"/>
+          </p:cNvSpPr>
+          <p:nvPr>
+            <p:ph idx="1"/>
+          </p:nvPr>
+        </p:nvSpPr>
+        <p:spPr/>
+        <p:txBody>
+          <a:bodyPr/>
+          <a:lstStyle/>
+          <a:p>
+            <a:r>
+              <a:rPr lang="en-US" dirty="0" err="1" smtClean="0"/>
+              <a:t>Git</a:t>
+            </a:r>
+            <a:r>
+              <a:rPr lang="en-US" dirty="0" smtClean="0"/>
+              <a:t> checkout master</a:t>
+            </a:r>
+          </a:p>
+          <a:p>
+            <a:r>
+              <a:rPr lang="en-US" dirty="0" err="1" smtClean="0"/>
+              <a:t>Git</a:t>
+            </a:r>
+            <a:r>
+              <a:rPr lang="en-US" dirty="0" smtClean="0"/>
+              <a:t> status</a:t>
+            </a:r>
+          </a:p>
+          <a:p>
+            <a:r>
+              <a:rPr lang="en-US" dirty="0" err="1" smtClean="0"/>
+              <a:t>Git</a:t>
+            </a:r>
+            <a:r>
+              <a:rPr lang="en-US" dirty="0" smtClean="0"/>
+              <a:t> </a:t>
+            </a:r>
+            <a:r>
+              <a:rPr lang="en-US" dirty="0"/>
+              <a:t>checkout </a:t>
+            </a:r>
+            <a:r>
+              <a:rPr lang="en-US" dirty="0" err="1" smtClean="0"/>
+              <a:t>branch_name</a:t>
+            </a:r>
+            <a:endParaRPr lang="en-US" dirty="0" smtClean="0"/>
+          </a:p>
+          <a:p>
+            <a:r>
+              <a:rPr lang="en-US" dirty="0" smtClean="0"/>
+              <a:t>Show the working directory</a:t>
+            </a:r>
+            <a:endParaRPr lang="en-US" dirty="0"/>
+          </a:p>
+        </p:txBody>
+      </p:sp>
+    </p:spTree>
+    <p:extLst>
+      <p:ext uri="{BB962C8B-B14F-4D97-AF65-F5344CB8AC3E}">
+        <p14:creationId xmlns:p14="http://schemas.microsoft.com/office/powerpoint/2010/main" val="2536902939"/>
+      </p:ext>
+    </p:extLst>
+  </p:cSld>
+  <p:clrMapOvr>
+    <a:masterClrMapping/>
+  </p:clrMapOvr>
+  <p:timing>
+    <p:tnLst>
+      <p:par>
+        <p:cTn id="1" dur="indefinite" restart="never" nodeType="tmRoot"/>
+      </p:par>
+    </p:tnLst>
+  </p:timing>
+</p:sld>
+</file>
+
+<file path=ppt/slides/slide35.xml><?xml version="1.0" encoding="utf-8"?>
+<p:sld xmlns:a="http://schemas.openxmlformats.org/drawingml/2006/main" xmlns:r="http://schemas.openxmlformats.org/officeDocument/2006/relationships" xmlns:p="http://schemas.openxmlformats.org/presentationml/2006/main">
+  <p:cSld>
+    <p:spTree>
+      <p:nvGrpSpPr>
+        <p:cNvPr id="1" name=""/>
+        <p:cNvGrpSpPr/>
+        <p:nvPr/>
+      </p:nvGrpSpPr>
+      <p:grpSpPr>
+        <a:xfrm>
+          <a:off x="0" y="0"/>
+          <a:ext cx="0" cy="0"/>
+          <a:chOff x="0" y="0"/>
+          <a:chExt cx="0" cy="0"/>
+        </a:xfrm>
+      </p:grpSpPr>
+      <p:sp>
+        <p:nvSpPr>
+          <p:cNvPr id="2" name="Title 1"/>
+          <p:cNvSpPr>
+            <a:spLocks noGrp="1"/>
+          </p:cNvSpPr>
+          <p:nvPr>
+            <p:ph type="title"/>
+          </p:nvPr>
+        </p:nvSpPr>
+        <p:spPr/>
+        <p:txBody>
+          <a:bodyPr>
+            <a:normAutofit/>
+          </a:bodyPr>
+          <a:lstStyle/>
+          <a:p>
+            <a:r>
+              <a:rPr lang="en-US" dirty="0" smtClean="0"/>
+              <a:t>Merging a branch</a:t>
+            </a:r>
+            <a:endParaRPr lang="en-US" dirty="0" smtClean="0"/>
+          </a:p>
+        </p:txBody>
+      </p:sp>
+      <p:sp>
+        <p:nvSpPr>
+          <p:cNvPr id="4" name="Slide Number Placeholder 3"/>
+          <p:cNvSpPr>
+            <a:spLocks noGrp="1"/>
+          </p:cNvSpPr>
+          <p:nvPr>
+            <p:ph type="sldNum" sz="quarter" idx="12"/>
+          </p:nvPr>
+        </p:nvSpPr>
+        <p:spPr/>
+        <p:txBody>
+          <a:bodyPr/>
+          <a:lstStyle/>
+          <a:p>
+            <a:fld id="{519954A3-9DFD-4C44-94BA-B95130A3BA1C}" type="slidenum">
+              <a:rPr lang="en-US" smtClean="0"/>
+              <a:t>35</a:t>
+            </a:fld>
+            <a:endParaRPr lang="en-US" dirty="0"/>
+          </a:p>
+        </p:txBody>
+      </p:sp>
+      <p:sp>
+        <p:nvSpPr>
+          <p:cNvPr id="6" name="Title 1"/>
+          <p:cNvSpPr txBox="1">
+            <a:spLocks/>
+          </p:cNvSpPr>
+          <p:nvPr/>
+        </p:nvSpPr>
+        <p:spPr>
+          <a:xfrm>
+            <a:off x="7735824" y="615696"/>
+            <a:ext cx="1538178" cy="1320800"/>
+          </a:xfrm>
+          <a:prstGeom prst="rect">
+            <a:avLst/>
+          </a:prstGeom>
+        </p:spPr>
+        <p:txBody>
+          <a:bodyPr vert="horz" lIns="91440" tIns="45720" rIns="91440" bIns="45720" rtlCol="0" anchor="t">
+            <a:normAutofit/>
+          </a:bodyPr>
+          <a:lstStyle>
+            <a:lvl1pPr algn="l" defTabSz="457200" rtl="0" eaLnBrk="1" latinLnBrk="0" hangingPunct="1">
+              <a:spcBef>
+                <a:spcPct val="0"/>
+              </a:spcBef>
+              <a:buNone/>
+              <a:defRPr sz="3600" kern="1200">
+                <a:solidFill>
+                  <a:schemeClr val="accent1"/>
+                </a:solidFill>
+                <a:latin typeface="+mj-lt"/>
+                <a:ea typeface="+mj-ea"/>
+                <a:cs typeface="+mj-cs"/>
+              </a:defRPr>
+            </a:lvl1pPr>
+            <a:lvl2pPr eaLnBrk="1" hangingPunct="1">
+              <a:defRPr>
+                <a:solidFill>
+                  <a:schemeClr val="tx2"/>
+                </a:solidFill>
+              </a:defRPr>
+            </a:lvl2pPr>
+            <a:lvl3pPr eaLnBrk="1" hangingPunct="1">
+              <a:defRPr>
+                <a:solidFill>
+                  <a:schemeClr val="tx2"/>
+                </a:solidFill>
+              </a:defRPr>
+            </a:lvl3pPr>
+            <a:lvl4pPr eaLnBrk="1" hangingPunct="1">
+              <a:defRPr>
+                <a:solidFill>
+                  <a:schemeClr val="tx2"/>
+                </a:solidFill>
+              </a:defRPr>
+            </a:lvl4pPr>
+            <a:lvl5pPr eaLnBrk="1" hangingPunct="1">
+              <a:defRPr>
+                <a:solidFill>
+                  <a:schemeClr val="tx2"/>
+                </a:solidFill>
+              </a:defRPr>
+            </a:lvl5pPr>
+            <a:lvl6pPr eaLnBrk="1" hangingPunct="1">
+              <a:defRPr>
+                <a:solidFill>
+                  <a:schemeClr val="tx2"/>
+                </a:solidFill>
+              </a:defRPr>
+            </a:lvl6pPr>
+            <a:lvl7pPr eaLnBrk="1" hangingPunct="1">
+              <a:defRPr>
+                <a:solidFill>
+                  <a:schemeClr val="tx2"/>
+                </a:solidFill>
+              </a:defRPr>
+            </a:lvl7pPr>
+            <a:lvl8pPr eaLnBrk="1" hangingPunct="1">
+              <a:defRPr>
+                <a:solidFill>
+                  <a:schemeClr val="tx2"/>
+                </a:solidFill>
+              </a:defRPr>
+            </a:lvl8pPr>
+            <a:lvl9pPr eaLnBrk="1" hangingPunct="1">
+              <a:defRPr>
+                <a:solidFill>
+                  <a:schemeClr val="tx2"/>
+                </a:solidFill>
+              </a:defRPr>
+            </a:lvl9pPr>
+          </a:lstStyle>
+          <a:p>
+            <a:pPr algn="ctr"/>
+            <a:r>
+              <a:rPr lang="en-US" sz="6000" dirty="0" smtClean="0"/>
+              <a:t>4.2</a:t>
+            </a:r>
+            <a:endParaRPr lang="en-US" sz="6000" dirty="0"/>
+          </a:p>
+        </p:txBody>
+      </p:sp>
+      <p:sp>
+        <p:nvSpPr>
+          <p:cNvPr id="7" name="Content Placeholder 6"/>
+          <p:cNvSpPr>
+            <a:spLocks noGrp="1"/>
+          </p:cNvSpPr>
+          <p:nvPr>
+            <p:ph idx="1"/>
+          </p:nvPr>
+        </p:nvSpPr>
+        <p:spPr/>
+        <p:txBody>
+          <a:bodyPr/>
+          <a:lstStyle/>
+          <a:p>
+            <a:r>
+              <a:rPr lang="en-US" dirty="0" smtClean="0"/>
+              <a:t>“Clean” merging</a:t>
+            </a:r>
+          </a:p>
+          <a:p>
+            <a:endParaRPr lang="en-US" dirty="0"/>
+          </a:p>
+          <a:p>
+            <a:r>
+              <a:rPr lang="en-US" dirty="0" smtClean="0"/>
+              <a:t>Dealing with conflicts</a:t>
+            </a:r>
+            <a:endParaRPr lang="en-US" dirty="0"/>
+          </a:p>
+        </p:txBody>
+      </p:sp>
+      <p:pic>
+        <p:nvPicPr>
+          <p:cNvPr id="2050" name="Picture 2" descr="Z:\home\techplex\projects\GitCheatSheet\memes\git conflicts.jpg"/>
+          <p:cNvPicPr>
+            <a:picLocks noChangeAspect="1" noChangeArrowheads="1"/>
+          </p:cNvPicPr>
+          <p:nvPr/>
+        </p:nvPicPr>
+        <p:blipFill>
+          <a:blip r:embed="rId3">
+            <a:extLst>
+              <a:ext uri="{28A0092B-C50C-407E-A947-70E740481C1C}">
+                <a14:useLocalDpi xmlns:a14="http://schemas.microsoft.com/office/drawing/2010/main" val="0"/>
+              </a:ext>
+            </a:extLst>
+          </a:blip>
+          <a:srcRect/>
+          <a:stretch>
+            <a:fillRect/>
+          </a:stretch>
+        </p:blipFill>
+        <p:spPr bwMode="auto">
+          <a:xfrm>
+            <a:off x="6832600" y="1758950"/>
+            <a:ext cx="5080000" cy="3860800"/>
+          </a:xfrm>
+          <a:prstGeom prst="rect">
+            <a:avLst/>
+          </a:prstGeom>
+          <a:noFill/>
+          <a:extLst>
+            <a:ext uri="{909E8E84-426E-40DD-AFC4-6F175D3DCCD1}">
+              <a14:hiddenFill xmlns:a14="http://schemas.microsoft.com/office/drawing/2010/main">
+                <a:solidFill>
+                  <a:srgbClr val="FFFFFF"/>
+                </a:solidFill>
+              </a14:hiddenFill>
+            </a:ext>
+          </a:extLst>
+        </p:spPr>
+      </p:pic>
+    </p:spTree>
+    <p:extLst>
+      <p:ext uri="{BB962C8B-B14F-4D97-AF65-F5344CB8AC3E}">
+        <p14:creationId xmlns:p14="http://schemas.microsoft.com/office/powerpoint/2010/main" val="3200584757"/>
+      </p:ext>
+    </p:extLst>
+  </p:cSld>
+  <p:clrMapOvr>
+    <a:masterClrMapping/>
+  </p:clrMapOvr>
+  <p:timing>
+    <p:tnLst>
+      <p:par>
+        <p:cTn id="1" dur="indefinite" restart="never" nodeType="tmRoot"/>
+      </p:par>
+    </p:tnLst>
+  </p:timing>
+</p:sld>
+</file>
+
+<file path=ppt/slides/slide36.xml><?xml version="1.0" encoding="utf-8"?>
+<p:sld xmlns:a="http://schemas.openxmlformats.org/drawingml/2006/main" xmlns:r="http://schemas.openxmlformats.org/officeDocument/2006/relationships" xmlns:p="http://schemas.openxmlformats.org/presentationml/2006/main">
+  <p:cSld>
+    <p:spTree>
+      <p:nvGrpSpPr>
+        <p:cNvPr id="1" name=""/>
+        <p:cNvGrpSpPr/>
+        <p:nvPr/>
+      </p:nvGrpSpPr>
+      <p:grpSpPr>
+        <a:xfrm>
+          <a:off x="0" y="0"/>
+          <a:ext cx="0" cy="0"/>
+          <a:chOff x="0" y="0"/>
+          <a:chExt cx="0" cy="0"/>
+        </a:xfrm>
+      </p:grpSpPr>
+      <p:sp>
+        <p:nvSpPr>
+          <p:cNvPr id="2" name="Title 1"/>
+          <p:cNvSpPr>
+            <a:spLocks noGrp="1"/>
+          </p:cNvSpPr>
+          <p:nvPr>
+            <p:ph type="ctrTitle"/>
+          </p:nvPr>
+        </p:nvSpPr>
+        <p:spPr/>
+        <p:txBody>
+          <a:bodyPr/>
+          <a:lstStyle/>
+          <a:p>
+            <a:pPr algn="l"/>
+            <a:r>
+              <a:rPr lang="en-US" dirty="0" smtClean="0"/>
+              <a:t>Module 5: </a:t>
+            </a:r>
+            <a:r>
+              <a:rPr lang="en-US" dirty="0"/>
+              <a:t/>
+            </a:r>
+            <a:br>
+              <a:rPr lang="en-US" dirty="0"/>
+            </a:br>
+            <a:r>
+              <a:rPr lang="en-US" dirty="0" smtClean="0"/>
+              <a:t>Collaborating</a:t>
+            </a:r>
+            <a:endParaRPr lang="en-US" dirty="0"/>
+          </a:p>
+        </p:txBody>
+      </p:sp>
+      <p:sp>
+        <p:nvSpPr>
+          <p:cNvPr id="3" name="Subtitle 2"/>
+          <p:cNvSpPr>
+            <a:spLocks noGrp="1"/>
+          </p:cNvSpPr>
+          <p:nvPr>
+            <p:ph type="subTitle" idx="1"/>
+          </p:nvPr>
+        </p:nvSpPr>
+        <p:spPr/>
+        <p:txBody>
+          <a:bodyPr/>
+          <a:lstStyle/>
+          <a:p>
+            <a:pPr algn="l"/>
+            <a:endParaRPr lang="en-US" dirty="0"/>
+          </a:p>
+        </p:txBody>
+      </p:sp>
+      <p:sp>
+        <p:nvSpPr>
+          <p:cNvPr id="4" name="Slide Number Placeholder 3"/>
+          <p:cNvSpPr>
+            <a:spLocks noGrp="1"/>
+          </p:cNvSpPr>
+          <p:nvPr>
+            <p:ph type="sldNum" sz="quarter" idx="12"/>
+          </p:nvPr>
+        </p:nvSpPr>
+        <p:spPr/>
+        <p:txBody>
+          <a:bodyPr/>
+          <a:lstStyle/>
+          <a:p>
+            <a:fld id="{D57F1E4F-1CFF-5643-939E-217C01CDF565}" type="slidenum">
+              <a:rPr lang="en-US" smtClean="0"/>
+              <a:pPr/>
+              <a:t>36</a:t>
+            </a:fld>
+            <a:endParaRPr lang="en-US" dirty="0"/>
+          </a:p>
+        </p:txBody>
+      </p:sp>
+      <p:pic>
+        <p:nvPicPr>
+          <p:cNvPr id="7170" name="Picture 2" descr="Z:\home\techplex\projects\GitCheatSheet\memes\w9tn6a.jpg"/>
+          <p:cNvPicPr>
+            <a:picLocks noChangeAspect="1" noChangeArrowheads="1"/>
+          </p:cNvPicPr>
+          <p:nvPr/>
+        </p:nvPicPr>
+        <p:blipFill>
+          <a:blip r:embed="rId2">
+            <a:extLst>
+              <a:ext uri="{28A0092B-C50C-407E-A947-70E740481C1C}">
+                <a14:useLocalDpi xmlns:a14="http://schemas.microsoft.com/office/drawing/2010/main" val="0"/>
+              </a:ext>
+            </a:extLst>
+          </a:blip>
+          <a:srcRect/>
+          <a:stretch>
+            <a:fillRect/>
+          </a:stretch>
+        </p:blipFill>
+        <p:spPr bwMode="auto">
+          <a:xfrm>
+            <a:off x="6096000" y="1181100"/>
+            <a:ext cx="4724400" cy="3543300"/>
+          </a:xfrm>
+          <a:prstGeom prst="rect">
+            <a:avLst/>
+          </a:prstGeom>
+          <a:noFill/>
+          <a:extLst>
+            <a:ext uri="{909E8E84-426E-40DD-AFC4-6F175D3DCCD1}">
+              <a14:hiddenFill xmlns:a14="http://schemas.microsoft.com/office/drawing/2010/main">
+                <a:solidFill>
+                  <a:srgbClr val="FFFFFF"/>
+                </a:solidFill>
+              </a14:hiddenFill>
+            </a:ext>
+          </a:extLst>
+        </p:spPr>
+      </p:pic>
+    </p:spTree>
+    <p:extLst>
+      <p:ext uri="{BB962C8B-B14F-4D97-AF65-F5344CB8AC3E}">
+        <p14:creationId xmlns:p14="http://schemas.microsoft.com/office/powerpoint/2010/main" val="3938132744"/>
+      </p:ext>
+    </p:extLst>
+  </p:cSld>
+  <p:clrMapOvr>
+    <a:masterClrMapping/>
+  </p:clrMapOvr>
+  <p:timing>
+    <p:tnLst>
+      <p:par>
+        <p:cTn id="1" dur="indefinite" restart="never" nodeType="tmRoot"/>
+      </p:par>
+    </p:tnLst>
+  </p:timing>
+</p:sld>
+</file>
+
+<file path=ppt/slides/slide37.xml><?xml version="1.0" encoding="utf-8"?>
+<p:sld xmlns:a="http://schemas.openxmlformats.org/drawingml/2006/main" xmlns:r="http://schemas.openxmlformats.org/officeDocument/2006/relationships" xmlns:p="http://schemas.openxmlformats.org/presentationml/2006/main">
+  <p:cSld>
+    <p:spTree>
+      <p:nvGrpSpPr>
+        <p:cNvPr id="1" name=""/>
+        <p:cNvGrpSpPr/>
+        <p:nvPr/>
+      </p:nvGrpSpPr>
+      <p:grpSpPr>
+        <a:xfrm>
+          <a:off x="0" y="0"/>
+          <a:ext cx="0" cy="0"/>
+          <a:chOff x="0" y="0"/>
+          <a:chExt cx="0" cy="0"/>
+        </a:xfrm>
+      </p:grpSpPr>
+      <p:sp>
+        <p:nvSpPr>
+          <p:cNvPr id="2" name="Title 1"/>
+          <p:cNvSpPr>
+            <a:spLocks noGrp="1"/>
+          </p:cNvSpPr>
+          <p:nvPr>
+            <p:ph type="title"/>
+          </p:nvPr>
+        </p:nvSpPr>
+        <p:spPr/>
+        <p:txBody>
+          <a:bodyPr>
+            <a:normAutofit/>
+          </a:bodyPr>
+          <a:lstStyle/>
+          <a:p>
+            <a:r>
+              <a:rPr lang="en-US" dirty="0" smtClean="0"/>
+              <a:t>Collaborating</a:t>
+            </a:r>
+            <a:br>
+              <a:rPr lang="en-US" dirty="0" smtClean="0"/>
+            </a:br>
+            <a:r>
+              <a:rPr lang="en-US" sz="2800" dirty="0" smtClean="0"/>
+              <a:t>Using </a:t>
+            </a:r>
+            <a:r>
+              <a:rPr lang="en-US" sz="2800" dirty="0" err="1" smtClean="0"/>
+              <a:t>Github</a:t>
+            </a:r>
+            <a:endParaRPr lang="en-US" dirty="0" smtClean="0"/>
+          </a:p>
+        </p:txBody>
+      </p:sp>
+      <p:sp>
+        <p:nvSpPr>
+          <p:cNvPr id="4" name="Slide Number Placeholder 3"/>
+          <p:cNvSpPr>
+            <a:spLocks noGrp="1"/>
+          </p:cNvSpPr>
+          <p:nvPr>
+            <p:ph type="sldNum" sz="quarter" idx="12"/>
+          </p:nvPr>
+        </p:nvSpPr>
+        <p:spPr/>
+        <p:txBody>
+          <a:bodyPr/>
+          <a:lstStyle/>
+          <a:p>
+            <a:fld id="{519954A3-9DFD-4C44-94BA-B95130A3BA1C}" type="slidenum">
+              <a:rPr lang="en-US" smtClean="0"/>
+              <a:t>37</a:t>
+            </a:fld>
+            <a:endParaRPr lang="en-US" dirty="0"/>
+          </a:p>
+        </p:txBody>
+      </p:sp>
+      <p:sp>
+        <p:nvSpPr>
+          <p:cNvPr id="6" name="Title 1"/>
+          <p:cNvSpPr txBox="1">
+            <a:spLocks/>
+          </p:cNvSpPr>
+          <p:nvPr/>
+        </p:nvSpPr>
+        <p:spPr>
+          <a:xfrm>
+            <a:off x="7735824" y="615696"/>
+            <a:ext cx="1538178" cy="1320800"/>
+          </a:xfrm>
+          <a:prstGeom prst="rect">
+            <a:avLst/>
+          </a:prstGeom>
+        </p:spPr>
+        <p:txBody>
+          <a:bodyPr vert="horz" lIns="91440" tIns="45720" rIns="91440" bIns="45720" rtlCol="0" anchor="t">
+            <a:normAutofit/>
+          </a:bodyPr>
+          <a:lstStyle>
+            <a:lvl1pPr algn="l" defTabSz="457200" rtl="0" eaLnBrk="1" latinLnBrk="0" hangingPunct="1">
+              <a:spcBef>
+                <a:spcPct val="0"/>
+              </a:spcBef>
+              <a:buNone/>
+              <a:defRPr sz="3600" kern="1200">
+                <a:solidFill>
+                  <a:schemeClr val="accent1"/>
+                </a:solidFill>
+                <a:latin typeface="+mj-lt"/>
+                <a:ea typeface="+mj-ea"/>
+                <a:cs typeface="+mj-cs"/>
+              </a:defRPr>
+            </a:lvl1pPr>
+            <a:lvl2pPr eaLnBrk="1" hangingPunct="1">
+              <a:defRPr>
+                <a:solidFill>
+                  <a:schemeClr val="tx2"/>
+                </a:solidFill>
+              </a:defRPr>
+            </a:lvl2pPr>
+            <a:lvl3pPr eaLnBrk="1" hangingPunct="1">
+              <a:defRPr>
+                <a:solidFill>
+                  <a:schemeClr val="tx2"/>
+                </a:solidFill>
+              </a:defRPr>
+            </a:lvl3pPr>
+            <a:lvl4pPr eaLnBrk="1" hangingPunct="1">
+              <a:defRPr>
+                <a:solidFill>
+                  <a:schemeClr val="tx2"/>
+                </a:solidFill>
+              </a:defRPr>
+            </a:lvl4pPr>
+            <a:lvl5pPr eaLnBrk="1" hangingPunct="1">
+              <a:defRPr>
+                <a:solidFill>
+                  <a:schemeClr val="tx2"/>
+                </a:solidFill>
+              </a:defRPr>
+            </a:lvl5pPr>
+            <a:lvl6pPr eaLnBrk="1" hangingPunct="1">
+              <a:defRPr>
+                <a:solidFill>
+                  <a:schemeClr val="tx2"/>
+                </a:solidFill>
+              </a:defRPr>
+            </a:lvl6pPr>
+            <a:lvl7pPr eaLnBrk="1" hangingPunct="1">
+              <a:defRPr>
+                <a:solidFill>
+                  <a:schemeClr val="tx2"/>
+                </a:solidFill>
+              </a:defRPr>
+            </a:lvl7pPr>
+            <a:lvl8pPr eaLnBrk="1" hangingPunct="1">
+              <a:defRPr>
+                <a:solidFill>
+                  <a:schemeClr val="tx2"/>
+                </a:solidFill>
+              </a:defRPr>
+            </a:lvl8pPr>
+            <a:lvl9pPr eaLnBrk="1" hangingPunct="1">
+              <a:defRPr>
+                <a:solidFill>
+                  <a:schemeClr val="tx2"/>
+                </a:solidFill>
+              </a:defRPr>
+            </a:lvl9pPr>
+          </a:lstStyle>
+          <a:p>
+            <a:pPr algn="ctr"/>
+            <a:r>
+              <a:rPr lang="en-US" sz="6000" dirty="0" smtClean="0"/>
+              <a:t>5.1</a:t>
+            </a:r>
+            <a:endParaRPr lang="en-US" sz="6000" dirty="0"/>
+          </a:p>
+        </p:txBody>
+      </p:sp>
+      <p:sp>
+        <p:nvSpPr>
+          <p:cNvPr id="7" name="Content Placeholder 6"/>
+          <p:cNvSpPr>
+            <a:spLocks noGrp="1"/>
+          </p:cNvSpPr>
+          <p:nvPr>
+            <p:ph idx="1"/>
+          </p:nvPr>
+        </p:nvSpPr>
+        <p:spPr/>
+        <p:txBody>
+          <a:bodyPr/>
+          <a:lstStyle/>
+          <a:p>
+            <a:endParaRPr lang="en-US" dirty="0"/>
+          </a:p>
+        </p:txBody>
+      </p:sp>
+      <p:pic>
+        <p:nvPicPr>
+          <p:cNvPr id="8194" name="Picture 2" descr="Z:\home\techplex\projects\GitCheatSheet\memes\oss comunism.jpg"/>
+          <p:cNvPicPr>
+            <a:picLocks noChangeAspect="1" noChangeArrowheads="1"/>
+          </p:cNvPicPr>
+          <p:nvPr/>
+        </p:nvPicPr>
+        <p:blipFill>
+          <a:blip r:embed="rId3">
+            <a:extLst>
+              <a:ext uri="{28A0092B-C50C-407E-A947-70E740481C1C}">
+                <a14:useLocalDpi xmlns:a14="http://schemas.microsoft.com/office/drawing/2010/main" val="0"/>
+              </a:ext>
+            </a:extLst>
+          </a:blip>
+          <a:srcRect/>
+          <a:stretch>
+            <a:fillRect/>
+          </a:stretch>
+        </p:blipFill>
+        <p:spPr bwMode="auto">
+          <a:xfrm>
+            <a:off x="8134349" y="1543376"/>
+            <a:ext cx="3822557" cy="5119361"/>
+          </a:xfrm>
+          <a:prstGeom prst="rect">
+            <a:avLst/>
+          </a:prstGeom>
+          <a:noFill/>
+          <a:extLst>
+            <a:ext uri="{909E8E84-426E-40DD-AFC4-6F175D3DCCD1}">
+              <a14:hiddenFill xmlns:a14="http://schemas.microsoft.com/office/drawing/2010/main">
+                <a:solidFill>
+                  <a:srgbClr val="FFFFFF"/>
+                </a:solidFill>
+              </a14:hiddenFill>
+            </a:ext>
+          </a:extLst>
+        </p:spPr>
+      </p:pic>
+    </p:spTree>
+    <p:extLst>
+      <p:ext uri="{BB962C8B-B14F-4D97-AF65-F5344CB8AC3E}">
+        <p14:creationId xmlns:p14="http://schemas.microsoft.com/office/powerpoint/2010/main" val="4029681537"/>
+      </p:ext>
+    </p:extLst>
+  </p:cSld>
+  <p:clrMapOvr>
+    <a:masterClrMapping/>
+  </p:clrMapOvr>
+  <p:timing>
+    <p:tnLst>
+      <p:par>
+        <p:cTn id="1" dur="indefinite" restart="never" nodeType="tmRoot"/>
+      </p:par>
+    </p:tnLst>
+  </p:timing>
+</p:sld>
+</file>
+
+<file path=ppt/slides/slide38.xml><?xml version="1.0" encoding="utf-8"?>
+<p:sld xmlns:a="http://schemas.openxmlformats.org/drawingml/2006/main" xmlns:r="http://schemas.openxmlformats.org/officeDocument/2006/relationships" xmlns:p="http://schemas.openxmlformats.org/presentationml/2006/main">
+  <p:cSld>
+    <p:spTree>
+      <p:nvGrpSpPr>
+        <p:cNvPr id="1" name=""/>
+        <p:cNvGrpSpPr/>
+        <p:nvPr/>
+      </p:nvGrpSpPr>
+      <p:grpSpPr>
+        <a:xfrm>
+          <a:off x="0" y="0"/>
+          <a:ext cx="0" cy="0"/>
+          <a:chOff x="0" y="0"/>
+          <a:chExt cx="0" cy="0"/>
+        </a:xfrm>
+      </p:grpSpPr>
+      <p:sp>
+        <p:nvSpPr>
+          <p:cNvPr id="2" name="Title 1"/>
+          <p:cNvSpPr>
+            <a:spLocks noGrp="1"/>
+          </p:cNvSpPr>
+          <p:nvPr>
             <p:ph type="ctrTitle"/>
           </p:nvPr>
         </p:nvSpPr>
@@ -17540,7 +19922,7 @@
             <a:fld id="{D57F1E4F-1CFF-5643-939E-217C01CDF565}" type="slidenum">
               <a:rPr lang="en-US" smtClean="0"/>
               <a:pPr/>
-              <a:t>34</a:t>
+              <a:t>38</a:t>
             </a:fld>
             <a:endParaRPr lang="en-US" dirty="0"/>
           </a:p>
@@ -17670,7 +20052,7 @@
 </p:sld>
 </file>
 
-<file path=ppt/slides/slide35.xml><?xml version="1.0" encoding="utf-8"?>
+<file path=ppt/slides/slide39.xml><?xml version="1.0" encoding="utf-8"?>
 <p:sld xmlns:a="http://schemas.openxmlformats.org/drawingml/2006/main" xmlns:r="http://schemas.openxmlformats.org/officeDocument/2006/relationships" xmlns:p="http://schemas.openxmlformats.org/presentationml/2006/main">
   <p:cSld>
     <p:spTree>
@@ -17755,7 +20137,17 @@
             </a:r>
             <a:r>
               <a:rPr lang="en-US" dirty="0" smtClean="0"/>
-              <a:t> here is how to set header</a:t>
+              <a:t> here is how to set </a:t>
+            </a:r>
+            <a:r>
+              <a:rPr lang="en-US" dirty="0" smtClean="0"/>
+              <a:t>header</a:t>
+            </a:r>
+          </a:p>
+          <a:p>
+            <a:r>
+              <a:rPr lang="en-US" dirty="0"/>
+              <a:t>http://git.io/vCV4U</a:t>
             </a:r>
             <a:endParaRPr lang="en-US" dirty="0"/>
           </a:p>
@@ -17881,7 +20273,7 @@
           <a:p>
             <a:fld id="{519954A3-9DFD-4C44-94BA-B95130A3BA1C}" type="slidenum">
               <a:rPr lang="en-US" smtClean="0"/>
-              <a:t>35</a:t>
+              <a:t>39</a:t>
             </a:fld>
             <a:endParaRPr lang="en-US" dirty="0"/>
           </a:p>
@@ -17904,140 +20296,6 @@
       </p:par>
     </p:tnLst>
   </p:timing>
-</p:sld>
-</file>
-
-<file path=ppt/slides/slide36.xml><?xml version="1.0" encoding="utf-8"?>
-<p:sld xmlns:a="http://schemas.openxmlformats.org/drawingml/2006/main" xmlns:r="http://schemas.openxmlformats.org/officeDocument/2006/relationships" xmlns:p="http://schemas.openxmlformats.org/presentationml/2006/main">
-  <p:cSld>
-    <p:spTree>
-      <p:nvGrpSpPr>
-        <p:cNvPr id="1" name=""/>
-        <p:cNvGrpSpPr/>
-        <p:nvPr/>
-      </p:nvGrpSpPr>
-      <p:grpSpPr>
-        <a:xfrm>
-          <a:off x="0" y="0"/>
-          <a:ext cx="0" cy="0"/>
-          <a:chOff x="0" y="0"/>
-          <a:chExt cx="0" cy="0"/>
-        </a:xfrm>
-      </p:grpSpPr>
-      <p:sp>
-        <p:nvSpPr>
-          <p:cNvPr id="2" name="Title 1"/>
-          <p:cNvSpPr>
-            <a:spLocks noGrp="1"/>
-          </p:cNvSpPr>
-          <p:nvPr>
-            <p:ph type="title"/>
-          </p:nvPr>
-        </p:nvSpPr>
-        <p:spPr>
-          <a:xfrm>
-            <a:off x="677334" y="609600"/>
-            <a:ext cx="8596668" cy="627529"/>
-          </a:xfrm>
-        </p:spPr>
-        <p:txBody>
-          <a:bodyPr>
-            <a:normAutofit fontScale="90000"/>
-          </a:bodyPr>
-          <a:lstStyle/>
-          <a:p>
-            <a:r>
-              <a:rPr lang="en-US" dirty="0" smtClean="0"/>
-              <a:t>Resources</a:t>
-            </a:r>
-            <a:endParaRPr lang="en-US" dirty="0"/>
-          </a:p>
-        </p:txBody>
-      </p:sp>
-      <p:sp>
-        <p:nvSpPr>
-          <p:cNvPr id="3" name="Content Placeholder 2"/>
-          <p:cNvSpPr>
-            <a:spLocks noGrp="1"/>
-          </p:cNvSpPr>
-          <p:nvPr>
-            <p:ph sz="half" idx="1"/>
-          </p:nvPr>
-        </p:nvSpPr>
-        <p:spPr>
-          <a:xfrm>
-            <a:off x="677334" y="1237129"/>
-            <a:ext cx="4184035" cy="4804232"/>
-          </a:xfrm>
-        </p:spPr>
-        <p:txBody>
-          <a:bodyPr/>
-          <a:lstStyle/>
-          <a:p>
-            <a:r>
-              <a:rPr lang="en-US" dirty="0"/>
-              <a:t>http://gitimmersion.com/</a:t>
-            </a:r>
-          </a:p>
-        </p:txBody>
-      </p:sp>
-      <p:sp>
-        <p:nvSpPr>
-          <p:cNvPr id="5" name="Content Placeholder 4"/>
-          <p:cNvSpPr>
-            <a:spLocks noGrp="1"/>
-          </p:cNvSpPr>
-          <p:nvPr>
-            <p:ph sz="half" idx="2"/>
-          </p:nvPr>
-        </p:nvSpPr>
-        <p:spPr>
-          <a:xfrm>
-            <a:off x="5089970" y="1237129"/>
-            <a:ext cx="4184034" cy="4804233"/>
-          </a:xfrm>
-        </p:spPr>
-        <p:txBody>
-          <a:bodyPr/>
-          <a:lstStyle/>
-          <a:p>
-            <a:endParaRPr lang="en-US" dirty="0"/>
-          </a:p>
-        </p:txBody>
-      </p:sp>
-      <p:sp>
-        <p:nvSpPr>
-          <p:cNvPr id="4" name="Slide Number Placeholder 3"/>
-          <p:cNvSpPr>
-            <a:spLocks noGrp="1"/>
-          </p:cNvSpPr>
-          <p:nvPr>
-            <p:ph type="sldNum" sz="quarter" idx="12"/>
-          </p:nvPr>
-        </p:nvSpPr>
-        <p:spPr/>
-        <p:txBody>
-          <a:bodyPr/>
-          <a:lstStyle/>
-          <a:p>
-            <a:fld id="{519954A3-9DFD-4C44-94BA-B95130A3BA1C}" type="slidenum">
-              <a:rPr lang="en-US" smtClean="0"/>
-              <a:t>36</a:t>
-            </a:fld>
-            <a:endParaRPr lang="en-US" dirty="0"/>
-          </a:p>
-        </p:txBody>
-      </p:sp>
-    </p:spTree>
-    <p:extLst>
-      <p:ext uri="{BB962C8B-B14F-4D97-AF65-F5344CB8AC3E}">
-        <p14:creationId xmlns:p14="http://schemas.microsoft.com/office/powerpoint/2010/main" val="418032451"/>
-      </p:ext>
-    </p:extLst>
-  </p:cSld>
-  <p:clrMapOvr>
-    <a:masterClrMapping/>
-  </p:clrMapOvr>
 </p:sld>
 </file>
 
@@ -18766,6 +21024,140 @@
 </p:sld>
 </file>
 
+<file path=ppt/slides/slide40.xml><?xml version="1.0" encoding="utf-8"?>
+<p:sld xmlns:a="http://schemas.openxmlformats.org/drawingml/2006/main" xmlns:r="http://schemas.openxmlformats.org/officeDocument/2006/relationships" xmlns:p="http://schemas.openxmlformats.org/presentationml/2006/main">
+  <p:cSld>
+    <p:spTree>
+      <p:nvGrpSpPr>
+        <p:cNvPr id="1" name=""/>
+        <p:cNvGrpSpPr/>
+        <p:nvPr/>
+      </p:nvGrpSpPr>
+      <p:grpSpPr>
+        <a:xfrm>
+          <a:off x="0" y="0"/>
+          <a:ext cx="0" cy="0"/>
+          <a:chOff x="0" y="0"/>
+          <a:chExt cx="0" cy="0"/>
+        </a:xfrm>
+      </p:grpSpPr>
+      <p:sp>
+        <p:nvSpPr>
+          <p:cNvPr id="2" name="Title 1"/>
+          <p:cNvSpPr>
+            <a:spLocks noGrp="1"/>
+          </p:cNvSpPr>
+          <p:nvPr>
+            <p:ph type="title"/>
+          </p:nvPr>
+        </p:nvSpPr>
+        <p:spPr>
+          <a:xfrm>
+            <a:off x="677334" y="609600"/>
+            <a:ext cx="8596668" cy="627529"/>
+          </a:xfrm>
+        </p:spPr>
+        <p:txBody>
+          <a:bodyPr>
+            <a:normAutofit fontScale="90000"/>
+          </a:bodyPr>
+          <a:lstStyle/>
+          <a:p>
+            <a:r>
+              <a:rPr lang="en-US" dirty="0" smtClean="0"/>
+              <a:t>Resources</a:t>
+            </a:r>
+            <a:endParaRPr lang="en-US" dirty="0"/>
+          </a:p>
+        </p:txBody>
+      </p:sp>
+      <p:sp>
+        <p:nvSpPr>
+          <p:cNvPr id="3" name="Content Placeholder 2"/>
+          <p:cNvSpPr>
+            <a:spLocks noGrp="1"/>
+          </p:cNvSpPr>
+          <p:nvPr>
+            <p:ph sz="half" idx="1"/>
+          </p:nvPr>
+        </p:nvSpPr>
+        <p:spPr>
+          <a:xfrm>
+            <a:off x="677334" y="1237129"/>
+            <a:ext cx="4184035" cy="4804232"/>
+          </a:xfrm>
+        </p:spPr>
+        <p:txBody>
+          <a:bodyPr/>
+          <a:lstStyle/>
+          <a:p>
+            <a:r>
+              <a:rPr lang="en-US" dirty="0"/>
+              <a:t>http://gitimmersion.com/</a:t>
+            </a:r>
+          </a:p>
+        </p:txBody>
+      </p:sp>
+      <p:sp>
+        <p:nvSpPr>
+          <p:cNvPr id="5" name="Content Placeholder 4"/>
+          <p:cNvSpPr>
+            <a:spLocks noGrp="1"/>
+          </p:cNvSpPr>
+          <p:nvPr>
+            <p:ph sz="half" idx="2"/>
+          </p:nvPr>
+        </p:nvSpPr>
+        <p:spPr>
+          <a:xfrm>
+            <a:off x="5089970" y="1237129"/>
+            <a:ext cx="4184034" cy="4804233"/>
+          </a:xfrm>
+        </p:spPr>
+        <p:txBody>
+          <a:bodyPr/>
+          <a:lstStyle/>
+          <a:p>
+            <a:endParaRPr lang="en-US" dirty="0"/>
+          </a:p>
+        </p:txBody>
+      </p:sp>
+      <p:sp>
+        <p:nvSpPr>
+          <p:cNvPr id="4" name="Slide Number Placeholder 3"/>
+          <p:cNvSpPr>
+            <a:spLocks noGrp="1"/>
+          </p:cNvSpPr>
+          <p:nvPr>
+            <p:ph type="sldNum" sz="quarter" idx="12"/>
+          </p:nvPr>
+        </p:nvSpPr>
+        <p:spPr/>
+        <p:txBody>
+          <a:bodyPr/>
+          <a:lstStyle/>
+          <a:p>
+            <a:fld id="{519954A3-9DFD-4C44-94BA-B95130A3BA1C}" type="slidenum">
+              <a:rPr lang="en-US" smtClean="0"/>
+              <a:t>40</a:t>
+            </a:fld>
+            <a:endParaRPr lang="en-US" dirty="0"/>
+          </a:p>
+        </p:txBody>
+      </p:sp>
+    </p:spTree>
+    <p:extLst>
+      <p:ext uri="{BB962C8B-B14F-4D97-AF65-F5344CB8AC3E}">
+        <p14:creationId xmlns:p14="http://schemas.microsoft.com/office/powerpoint/2010/main" val="418032451"/>
+      </p:ext>
+    </p:extLst>
+  </p:cSld>
+  <p:clrMapOvr>
+    <a:masterClrMapping/>
+  </p:clrMapOvr>
+</p:sld>
+</file>
+
 <file path=ppt/slides/slide5.xml><?xml version="1.0" encoding="utf-8"?>
 <p:sld xmlns:a="http://schemas.openxmlformats.org/drawingml/2006/main" xmlns:r="http://schemas.openxmlformats.org/officeDocument/2006/relationships" xmlns:p="http://schemas.openxmlformats.org/presentationml/2006/main">
   <p:cSld>
@@ -19028,10 +21420,10 @@
               <a:rPr lang="en-US" dirty="0" smtClean="0"/>
             </a:br>
             <a:r>
-              <a:rPr lang="en-US" sz="2400" dirty="0" smtClean="0"/>
+              <a:rPr lang="en-US" sz="2800" dirty="0" smtClean="0"/>
               <a:t>Where your code lives</a:t>
             </a:r>
-            <a:endParaRPr lang="en-US" dirty="0"/>
+            <a:endParaRPr lang="en-US" sz="4000" dirty="0"/>
           </a:p>
         </p:txBody>
       </p:sp>
@@ -21557,7 +23949,7 @@
   <a:extraClrSchemeLst/>
   <a:extLst>
     <a:ext uri="{05A4C25C-085E-4340-85A3-A5531E510DB2}">
-      <thm15:themeFamily xmlns:thm15="http://schemas.microsoft.com/office/thememl/2012/main" name="Facet" id="{C0C680CD-088A-49FC-A102-D699147F32B2}" vid="{0B5AB586-D108-4FC1-8368-649FE654B894}"/>
+      <thm15:themeFamily xmlns:thm15="http://schemas.microsoft.com/office/thememl/2012/main" xmlns="" name="Facet" id="{C0C680CD-088A-49FC-A102-D699147F32B2}" vid="{0B5AB586-D108-4FC1-8368-649FE654B894}"/>
     </a:ext>
   </a:extLst>
 </a:theme>
@@ -21818,7 +24210,7 @@
   <a:extraClrSchemeLst/>
   <a:extLst>
     <a:ext uri="{05A4C25C-085E-4340-85A3-A5531E510DB2}">
-      <thm15:themeFamily xmlns:thm15="http://schemas.microsoft.com/office/thememl/2012/main" name="Office Theme" id="{62F939B6-93AF-4DB8-9C6B-D6C7DFDC589F}" vid="{4A3C46E8-61CC-4603-A589-7422A47A8E4A}"/>
+      <thm15:themeFamily xmlns:thm15="http://schemas.microsoft.com/office/thememl/2012/main" xmlns="" name="Office Theme" id="{62F939B6-93AF-4DB8-9C6B-D6C7DFDC589F}" vid="{4A3C46E8-61CC-4603-A589-7422A47A8E4A}"/>
     </a:ext>
   </a:extLst>
 </a:theme>

</xml_diff>